<commit_message>
draft 1 of github class
</commit_message>
<xml_diff>
--- a/github/Introduction to Git & GitHub.pptx
+++ b/github/Introduction to Git & GitHub.pptx
@@ -6213,13 +6213,60 @@
           <a:p>
             <a:r>
               <a:rPr lang="en-US" dirty="0"/>
-              <a:t>A </a:t>
-            </a:r>
-            <a:r>
-              <a:rPr lang="en-US"/>
-              <a:t>version-control system</a:t>
-            </a:r>
-            <a:endParaRPr lang="en-US" dirty="0"/>
+              <a:t>A version-control system</a:t>
+            </a:r>
+          </a:p>
+          <a:p>
+            <a:pPr lvl="1"/>
+            <a:r>
+              <a:rPr lang="en-US" dirty="0"/>
+              <a:t>Keeps track of files over time</a:t>
+            </a:r>
+          </a:p>
+          <a:p>
+            <a:pPr lvl="1"/>
+            <a:r>
+              <a:rPr lang="en-US" dirty="0"/>
+              <a:t>Monitors changes</a:t>
+            </a:r>
+          </a:p>
+          <a:p>
+            <a:r>
+              <a:rPr lang="en-US" dirty="0"/>
+              <a:t>Free and Open-Source Software</a:t>
+            </a:r>
+          </a:p>
+          <a:p>
+            <a:r>
+              <a:rPr lang="en-US" dirty="0"/>
+              <a:t>Fast &amp; Simple</a:t>
+            </a:r>
+          </a:p>
+          <a:p>
+            <a:r>
+              <a:rPr lang="en-US" dirty="0"/>
+              <a:t>Optimized for collaboration</a:t>
+            </a:r>
+          </a:p>
+          <a:p>
+            <a:pPr lvl="1"/>
+            <a:r>
+              <a:rPr lang="en-US" dirty="0"/>
+              <a:t>Everyone has the entire project history</a:t>
+            </a:r>
+          </a:p>
+          <a:p>
+            <a:pPr lvl="1"/>
+            <a:r>
+              <a:rPr lang="en-US" dirty="0"/>
+              <a:t>Allows for non-linear development</a:t>
+            </a:r>
+          </a:p>
+          <a:p>
+            <a:r>
+              <a:rPr lang="en-US" dirty="0"/>
+              <a:t>The most widely used version-control system!</a:t>
+            </a:r>
           </a:p>
         </p:txBody>
       </p:sp>
@@ -6320,6 +6367,36 @@
           </a:p>
         </p:txBody>
       </p:sp>
+      <p:pic>
+        <p:nvPicPr>
+          <p:cNvPr id="8" name="Picture 7">
+            <a:extLst>
+              <a:ext uri="{FF2B5EF4-FFF2-40B4-BE49-F238E27FC236}">
+                <a16:creationId xmlns:a16="http://schemas.microsoft.com/office/drawing/2014/main" id="{3F172DED-B53F-4A4E-9071-112D799B874D}"/>
+              </a:ext>
+            </a:extLst>
+          </p:cNvPr>
+          <p:cNvPicPr>
+            <a:picLocks noChangeAspect="1"/>
+          </p:cNvPicPr>
+          <p:nvPr/>
+        </p:nvPicPr>
+        <p:blipFill>
+          <a:blip r:embed="rId2"/>
+          <a:stretch>
+            <a:fillRect/>
+          </a:stretch>
+        </p:blipFill>
+        <p:spPr>
+          <a:xfrm>
+            <a:off x="6584577" y="2479203"/>
+            <a:ext cx="4549028" cy="1899594"/>
+          </a:xfrm>
+          <a:prstGeom prst="rect">
+            <a:avLst/>
+          </a:prstGeom>
+        </p:spPr>
+      </p:pic>
     </p:spTree>
     <p:extLst>
       <p:ext uri="{BB962C8B-B14F-4D97-AF65-F5344CB8AC3E}">
@@ -8725,12 +8802,52 @@
             <p:ph idx="1"/>
           </p:nvPr>
         </p:nvSpPr>
-        <p:spPr/>
-        <p:txBody>
-          <a:bodyPr/>
-          <a:lstStyle/>
-          <a:p>
-            <a:endParaRPr lang="en-US"/>
+        <p:spPr>
+          <a:xfrm>
+            <a:off x="838200" y="1825625"/>
+            <a:ext cx="5665694" cy="4351338"/>
+          </a:xfrm>
+        </p:spPr>
+        <p:txBody>
+          <a:bodyPr/>
+          <a:lstStyle/>
+          <a:p>
+            <a:r>
+              <a:rPr lang="en-US" dirty="0"/>
+              <a:t>Affiliated with GitHub (which is owned by Microsoft)</a:t>
+            </a:r>
+          </a:p>
+          <a:p>
+            <a:r>
+              <a:rPr lang="en-US" dirty="0"/>
+              <a:t>A file editor</a:t>
+            </a:r>
+          </a:p>
+          <a:p>
+            <a:r>
+              <a:rPr lang="en-US" dirty="0"/>
+              <a:t>A graphical user interface</a:t>
+            </a:r>
+          </a:p>
+          <a:p>
+            <a:pPr lvl="1"/>
+            <a:r>
+              <a:rPr lang="en-US" dirty="0"/>
+              <a:t>Many user interfaces exist</a:t>
+            </a:r>
+          </a:p>
+          <a:p>
+            <a:r>
+              <a:rPr lang="en-US" dirty="0"/>
+              <a:t>Automatic</a:t>
+            </a:r>
+          </a:p>
+          <a:p>
+            <a:pPr lvl="1"/>
+            <a:r>
+              <a:rPr lang="en-US" dirty="0"/>
+              <a:t>Must tell git about everything we do!</a:t>
+            </a:r>
           </a:p>
         </p:txBody>
       </p:sp>
@@ -8831,6 +8948,36 @@
           </a:p>
         </p:txBody>
       </p:sp>
+      <p:pic>
+        <p:nvPicPr>
+          <p:cNvPr id="8" name="Picture 7">
+            <a:extLst>
+              <a:ext uri="{FF2B5EF4-FFF2-40B4-BE49-F238E27FC236}">
+                <a16:creationId xmlns:a16="http://schemas.microsoft.com/office/drawing/2014/main" id="{779C15CB-70D1-48B8-A927-9EAE0A4EEE3E}"/>
+              </a:ext>
+            </a:extLst>
+          </p:cNvPr>
+          <p:cNvPicPr>
+            <a:picLocks noChangeAspect="1"/>
+          </p:cNvPicPr>
+          <p:nvPr/>
+        </p:nvPicPr>
+        <p:blipFill>
+          <a:blip r:embed="rId2"/>
+          <a:stretch>
+            <a:fillRect/>
+          </a:stretch>
+        </p:blipFill>
+        <p:spPr>
+          <a:xfrm>
+            <a:off x="6584577" y="2479203"/>
+            <a:ext cx="4549028" cy="1899594"/>
+          </a:xfrm>
+          <a:prstGeom prst="rect">
+            <a:avLst/>
+          </a:prstGeom>
+        </p:spPr>
+      </p:pic>
     </p:spTree>
     <p:extLst>
       <p:ext uri="{BB962C8B-B14F-4D97-AF65-F5344CB8AC3E}">
@@ -11936,25 +12083,35 @@
           </a:p>
         </p:txBody>
       </p:sp>
-      <p:sp>
-        <p:nvSpPr>
-          <p:cNvPr id="3" name="Content Placeholder 2"/>
-          <p:cNvSpPr>
-            <a:spLocks noGrp="1"/>
-          </p:cNvSpPr>
+      <p:pic>
+        <p:nvPicPr>
+          <p:cNvPr id="8" name="Content Placeholder 7">
+            <a:extLst>
+              <a:ext uri="{FF2B5EF4-FFF2-40B4-BE49-F238E27FC236}">
+                <a16:creationId xmlns:a16="http://schemas.microsoft.com/office/drawing/2014/main" id="{55F5BDAA-3BD0-4E79-AC0F-46319E23DD68}"/>
+              </a:ext>
+            </a:extLst>
+          </p:cNvPr>
+          <p:cNvPicPr>
+            <a:picLocks noGrp="1" noChangeAspect="1"/>
+          </p:cNvPicPr>
           <p:nvPr>
             <p:ph idx="1"/>
           </p:nvPr>
-        </p:nvSpPr>
-        <p:spPr/>
-        <p:txBody>
-          <a:bodyPr/>
-          <a:lstStyle/>
-          <a:p>
-            <a:endParaRPr lang="en-US"/>
-          </a:p>
-        </p:txBody>
-      </p:sp>
+        </p:nvPicPr>
+        <p:blipFill>
+          <a:blip r:embed="rId2"/>
+          <a:stretch>
+            <a:fillRect/>
+          </a:stretch>
+        </p:blipFill>
+        <p:spPr>
+          <a:xfrm>
+            <a:off x="7699071" y="1347343"/>
+            <a:ext cx="3249594" cy="2701225"/>
+          </a:xfrm>
+        </p:spPr>
+      </p:pic>
       <p:sp>
         <p:nvSpPr>
           <p:cNvPr id="5" name="Date Placeholder 4"/>
@@ -12049,6 +12206,281 @@
               <a:t> library.rice.edu/dss</a:t>
             </a:r>
             <a:endParaRPr lang="en-US" dirty="0"/>
+          </a:p>
+        </p:txBody>
+      </p:sp>
+      <p:pic>
+        <p:nvPicPr>
+          <p:cNvPr id="10" name="Picture 9">
+            <a:extLst>
+              <a:ext uri="{FF2B5EF4-FFF2-40B4-BE49-F238E27FC236}">
+                <a16:creationId xmlns:a16="http://schemas.microsoft.com/office/drawing/2014/main" id="{60B37E9D-2C05-4A2E-8CBE-F38BAD4C28A3}"/>
+              </a:ext>
+            </a:extLst>
+          </p:cNvPr>
+          <p:cNvPicPr>
+            <a:picLocks noChangeAspect="1"/>
+          </p:cNvPicPr>
+          <p:nvPr/>
+        </p:nvPicPr>
+        <p:blipFill>
+          <a:blip r:embed="rId3"/>
+          <a:stretch>
+            <a:fillRect/>
+          </a:stretch>
+        </p:blipFill>
+        <p:spPr>
+          <a:xfrm>
+            <a:off x="6649090" y="3715575"/>
+            <a:ext cx="5349555" cy="2193317"/>
+          </a:xfrm>
+          <a:prstGeom prst="rect">
+            <a:avLst/>
+          </a:prstGeom>
+        </p:spPr>
+      </p:pic>
+      <p:sp>
+        <p:nvSpPr>
+          <p:cNvPr id="11" name="Content Placeholder 2">
+            <a:extLst>
+              <a:ext uri="{FF2B5EF4-FFF2-40B4-BE49-F238E27FC236}">
+                <a16:creationId xmlns:a16="http://schemas.microsoft.com/office/drawing/2014/main" id="{FE1B108A-3F0D-4D42-A4B2-178657E7D869}"/>
+              </a:ext>
+            </a:extLst>
+          </p:cNvPr>
+          <p:cNvSpPr txBox="1">
+            <a:spLocks/>
+          </p:cNvSpPr>
+          <p:nvPr/>
+        </p:nvSpPr>
+        <p:spPr>
+          <a:xfrm>
+            <a:off x="838200" y="1825625"/>
+            <a:ext cx="5199529" cy="4351338"/>
+          </a:xfrm>
+          <a:prstGeom prst="rect">
+            <a:avLst/>
+          </a:prstGeom>
+        </p:spPr>
+        <p:txBody>
+          <a:bodyPr vert="horz" lIns="91440" tIns="45720" rIns="91440" bIns="45720" rtlCol="0">
+            <a:normAutofit/>
+          </a:bodyPr>
+          <a:lstStyle>
+            <a:lvl1pPr marL="228600" indent="-228600" algn="l" defTabSz="914400" rtl="0" eaLnBrk="1" latinLnBrk="0" hangingPunct="1">
+              <a:lnSpc>
+                <a:spcPct val="90000"/>
+              </a:lnSpc>
+              <a:spcBef>
+                <a:spcPts val="1000"/>
+              </a:spcBef>
+              <a:buFont typeface="Arial" panose="020B0604020202020204" pitchFamily="34" charset="0"/>
+              <a:buChar char="•"/>
+              <a:defRPr sz="2800" kern="1200">
+                <a:solidFill>
+                  <a:schemeClr val="tx1"/>
+                </a:solidFill>
+                <a:latin typeface="+mn-lt"/>
+                <a:ea typeface="+mn-ea"/>
+                <a:cs typeface="+mn-cs"/>
+              </a:defRPr>
+            </a:lvl1pPr>
+            <a:lvl2pPr marL="685800" indent="-228600" algn="l" defTabSz="914400" rtl="0" eaLnBrk="1" latinLnBrk="0" hangingPunct="1">
+              <a:lnSpc>
+                <a:spcPct val="90000"/>
+              </a:lnSpc>
+              <a:spcBef>
+                <a:spcPts val="500"/>
+              </a:spcBef>
+              <a:buFont typeface="Arial" panose="020B0604020202020204" pitchFamily="34" charset="0"/>
+              <a:buChar char="•"/>
+              <a:defRPr sz="2400" kern="1200">
+                <a:solidFill>
+                  <a:schemeClr val="tx1"/>
+                </a:solidFill>
+                <a:latin typeface="+mn-lt"/>
+                <a:ea typeface="+mn-ea"/>
+                <a:cs typeface="+mn-cs"/>
+              </a:defRPr>
+            </a:lvl2pPr>
+            <a:lvl3pPr marL="1143000" indent="-228600" algn="l" defTabSz="914400" rtl="0" eaLnBrk="1" latinLnBrk="0" hangingPunct="1">
+              <a:lnSpc>
+                <a:spcPct val="90000"/>
+              </a:lnSpc>
+              <a:spcBef>
+                <a:spcPts val="500"/>
+              </a:spcBef>
+              <a:buFont typeface="Arial" panose="020B0604020202020204" pitchFamily="34" charset="0"/>
+              <a:buChar char="•"/>
+              <a:defRPr sz="2000" kern="1200">
+                <a:solidFill>
+                  <a:schemeClr val="tx1"/>
+                </a:solidFill>
+                <a:latin typeface="+mn-lt"/>
+                <a:ea typeface="+mn-ea"/>
+                <a:cs typeface="+mn-cs"/>
+              </a:defRPr>
+            </a:lvl3pPr>
+            <a:lvl4pPr marL="1600200" indent="-228600" algn="l" defTabSz="914400" rtl="0" eaLnBrk="1" latinLnBrk="0" hangingPunct="1">
+              <a:lnSpc>
+                <a:spcPct val="90000"/>
+              </a:lnSpc>
+              <a:spcBef>
+                <a:spcPts val="500"/>
+              </a:spcBef>
+              <a:buFont typeface="Arial" panose="020B0604020202020204" pitchFamily="34" charset="0"/>
+              <a:buChar char="•"/>
+              <a:defRPr sz="1800" kern="1200">
+                <a:solidFill>
+                  <a:schemeClr val="tx1"/>
+                </a:solidFill>
+                <a:latin typeface="+mn-lt"/>
+                <a:ea typeface="+mn-ea"/>
+                <a:cs typeface="+mn-cs"/>
+              </a:defRPr>
+            </a:lvl4pPr>
+            <a:lvl5pPr marL="2057400" indent="-228600" algn="l" defTabSz="914400" rtl="0" eaLnBrk="1" latinLnBrk="0" hangingPunct="1">
+              <a:lnSpc>
+                <a:spcPct val="90000"/>
+              </a:lnSpc>
+              <a:spcBef>
+                <a:spcPts val="500"/>
+              </a:spcBef>
+              <a:buFont typeface="Arial" panose="020B0604020202020204" pitchFamily="34" charset="0"/>
+              <a:buChar char="•"/>
+              <a:defRPr sz="1800" kern="1200">
+                <a:solidFill>
+                  <a:schemeClr val="tx1"/>
+                </a:solidFill>
+                <a:latin typeface="+mn-lt"/>
+                <a:ea typeface="+mn-ea"/>
+                <a:cs typeface="+mn-cs"/>
+              </a:defRPr>
+            </a:lvl5pPr>
+            <a:lvl6pPr marL="2514600" indent="-228600" algn="l" defTabSz="914400" rtl="0" eaLnBrk="1" latinLnBrk="0" hangingPunct="1">
+              <a:lnSpc>
+                <a:spcPct val="90000"/>
+              </a:lnSpc>
+              <a:spcBef>
+                <a:spcPts val="500"/>
+              </a:spcBef>
+              <a:buFont typeface="Arial" panose="020B0604020202020204" pitchFamily="34" charset="0"/>
+              <a:buChar char="•"/>
+              <a:defRPr sz="1800" kern="1200">
+                <a:solidFill>
+                  <a:schemeClr val="tx1"/>
+                </a:solidFill>
+                <a:latin typeface="+mn-lt"/>
+                <a:ea typeface="+mn-ea"/>
+                <a:cs typeface="+mn-cs"/>
+              </a:defRPr>
+            </a:lvl6pPr>
+            <a:lvl7pPr marL="2971800" indent="-228600" algn="l" defTabSz="914400" rtl="0" eaLnBrk="1" latinLnBrk="0" hangingPunct="1">
+              <a:lnSpc>
+                <a:spcPct val="90000"/>
+              </a:lnSpc>
+              <a:spcBef>
+                <a:spcPts val="500"/>
+              </a:spcBef>
+              <a:buFont typeface="Arial" panose="020B0604020202020204" pitchFamily="34" charset="0"/>
+              <a:buChar char="•"/>
+              <a:defRPr sz="1800" kern="1200">
+                <a:solidFill>
+                  <a:schemeClr val="tx1"/>
+                </a:solidFill>
+                <a:latin typeface="+mn-lt"/>
+                <a:ea typeface="+mn-ea"/>
+                <a:cs typeface="+mn-cs"/>
+              </a:defRPr>
+            </a:lvl7pPr>
+            <a:lvl8pPr marL="3429000" indent="-228600" algn="l" defTabSz="914400" rtl="0" eaLnBrk="1" latinLnBrk="0" hangingPunct="1">
+              <a:lnSpc>
+                <a:spcPct val="90000"/>
+              </a:lnSpc>
+              <a:spcBef>
+                <a:spcPts val="500"/>
+              </a:spcBef>
+              <a:buFont typeface="Arial" panose="020B0604020202020204" pitchFamily="34" charset="0"/>
+              <a:buChar char="•"/>
+              <a:defRPr sz="1800" kern="1200">
+                <a:solidFill>
+                  <a:schemeClr val="tx1"/>
+                </a:solidFill>
+                <a:latin typeface="+mn-lt"/>
+                <a:ea typeface="+mn-ea"/>
+                <a:cs typeface="+mn-cs"/>
+              </a:defRPr>
+            </a:lvl8pPr>
+            <a:lvl9pPr marL="3886200" indent="-228600" algn="l" defTabSz="914400" rtl="0" eaLnBrk="1" latinLnBrk="0" hangingPunct="1">
+              <a:lnSpc>
+                <a:spcPct val="90000"/>
+              </a:lnSpc>
+              <a:spcBef>
+                <a:spcPts val="500"/>
+              </a:spcBef>
+              <a:buFont typeface="Arial" panose="020B0604020202020204" pitchFamily="34" charset="0"/>
+              <a:buChar char="•"/>
+              <a:defRPr sz="1800" kern="1200">
+                <a:solidFill>
+                  <a:schemeClr val="tx1"/>
+                </a:solidFill>
+                <a:latin typeface="+mn-lt"/>
+                <a:ea typeface="+mn-ea"/>
+                <a:cs typeface="+mn-cs"/>
+              </a:defRPr>
+            </a:lvl9pPr>
+          </a:lstStyle>
+          <a:p>
+            <a:r>
+              <a:rPr lang="en-US" dirty="0"/>
+              <a:t>The largest host for Git repositories</a:t>
+            </a:r>
+          </a:p>
+          <a:p>
+            <a:r>
+              <a:rPr lang="en-US" dirty="0"/>
+              <a:t>Free (for public repositories)</a:t>
+            </a:r>
+          </a:p>
+          <a:p>
+            <a:r>
+              <a:rPr lang="en-US" dirty="0"/>
+              <a:t>A great place to collaborate</a:t>
+            </a:r>
+          </a:p>
+          <a:p>
+            <a:pPr lvl="1"/>
+            <a:r>
+              <a:rPr lang="en-US" dirty="0"/>
+              <a:t>Support for unique features</a:t>
+            </a:r>
+          </a:p>
+          <a:p>
+            <a:pPr lvl="1"/>
+            <a:r>
+              <a:rPr lang="en-US" dirty="0"/>
+              <a:t>Comment sections</a:t>
+            </a:r>
+          </a:p>
+          <a:p>
+            <a:pPr lvl="1"/>
+            <a:r>
+              <a:rPr lang="en-US" dirty="0"/>
+              <a:t>Organizations</a:t>
+            </a:r>
+          </a:p>
+          <a:p>
+            <a:pPr lvl="1"/>
+            <a:r>
+              <a:rPr lang="en-US" dirty="0"/>
+              <a:t>Issue tracking</a:t>
+            </a:r>
+          </a:p>
+          <a:p>
+            <a:r>
+              <a:rPr lang="en-US" dirty="0"/>
+              <a:t>Extensible!</a:t>
+            </a:r>
           </a:p>
         </p:txBody>
       </p:sp>
@@ -12358,7 +12790,15 @@
           <a:p>
             <a:r>
               <a:rPr lang="en-US" dirty="0"/>
-              <a:t>The GitHub mark is used under their official license (</a:t>
+              <a:t>The GitHub Mark and </a:t>
+            </a:r>
+            <a:r>
+              <a:rPr lang="en-US" dirty="0" err="1"/>
+              <a:t>Octocat</a:t>
+            </a:r>
+            <a:r>
+              <a:rPr lang="en-US" dirty="0"/>
+              <a:t> are used under their official license (</a:t>
             </a:r>
             <a:r>
               <a:rPr lang="en-US" dirty="0">
@@ -12374,13 +12814,22 @@
           <a:p>
             <a:r>
               <a:rPr lang="en-US" dirty="0"/>
-              <a:t>Screenshots are taken from </a:t>
-            </a:r>
-            <a:r>
-              <a:rPr lang="en-US"/>
-              <a:t>GitHub Desktop and Atom.</a:t>
-            </a:r>
-            <a:endParaRPr lang="en-US" dirty="0"/>
+              <a:t>The Git logo is used under the Creative Commons Attribution 3.0 </a:t>
+            </a:r>
+            <a:r>
+              <a:rPr lang="en-US" dirty="0" err="1"/>
+              <a:t>Unported</a:t>
+            </a:r>
+            <a:r>
+              <a:rPr lang="en-US" dirty="0"/>
+              <a:t> License. </a:t>
+            </a:r>
+          </a:p>
+          <a:p>
+            <a:r>
+              <a:rPr lang="en-US" dirty="0"/>
+              <a:t>Screenshots are taken from GitHub Desktop and Atom.</a:t>
+            </a:r>
           </a:p>
         </p:txBody>
       </p:sp>
@@ -12545,12 +12994,49 @@
             <p:ph idx="1"/>
           </p:nvPr>
         </p:nvSpPr>
-        <p:spPr/>
-        <p:txBody>
-          <a:bodyPr/>
-          <a:lstStyle/>
-          <a:p>
-            <a:endParaRPr lang="en-US"/>
+        <p:spPr>
+          <a:xfrm>
+            <a:off x="838200" y="1825625"/>
+            <a:ext cx="5257800" cy="4351338"/>
+          </a:xfrm>
+        </p:spPr>
+        <p:txBody>
+          <a:bodyPr/>
+          <a:lstStyle/>
+          <a:p>
+            <a:r>
+              <a:rPr lang="en-US" dirty="0"/>
+              <a:t>The only option</a:t>
+            </a:r>
+          </a:p>
+          <a:p>
+            <a:pPr lvl="1"/>
+            <a:r>
+              <a:rPr lang="en-US" dirty="0"/>
+              <a:t>GitLab, Bitbucket, …</a:t>
+            </a:r>
+          </a:p>
+          <a:p>
+            <a:r>
+              <a:rPr lang="en-US" dirty="0"/>
+              <a:t>A version-control system</a:t>
+            </a:r>
+          </a:p>
+          <a:p>
+            <a:pPr lvl="1"/>
+            <a:r>
+              <a:rPr lang="en-US" dirty="0"/>
+              <a:t>Everything is on top of git!</a:t>
+            </a:r>
+          </a:p>
+          <a:p>
+            <a:r>
+              <a:rPr lang="en-US" dirty="0"/>
+              <a:t>Difficult!</a:t>
+            </a:r>
+          </a:p>
+          <a:p>
+            <a:endParaRPr lang="en-US" dirty="0"/>
           </a:p>
         </p:txBody>
       </p:sp>
@@ -12651,6 +13137,66 @@
           </a:p>
         </p:txBody>
       </p:sp>
+      <p:pic>
+        <p:nvPicPr>
+          <p:cNvPr id="8" name="Content Placeholder 7">
+            <a:extLst>
+              <a:ext uri="{FF2B5EF4-FFF2-40B4-BE49-F238E27FC236}">
+                <a16:creationId xmlns:a16="http://schemas.microsoft.com/office/drawing/2014/main" id="{87F06DDF-644C-4810-8FE6-29B7E9A91A48}"/>
+              </a:ext>
+            </a:extLst>
+          </p:cNvPr>
+          <p:cNvPicPr>
+            <a:picLocks noChangeAspect="1"/>
+          </p:cNvPicPr>
+          <p:nvPr/>
+        </p:nvPicPr>
+        <p:blipFill>
+          <a:blip r:embed="rId2"/>
+          <a:stretch>
+            <a:fillRect/>
+          </a:stretch>
+        </p:blipFill>
+        <p:spPr>
+          <a:xfrm>
+            <a:off x="7699071" y="1347343"/>
+            <a:ext cx="3249594" cy="2701225"/>
+          </a:xfrm>
+          <a:prstGeom prst="rect">
+            <a:avLst/>
+          </a:prstGeom>
+        </p:spPr>
+      </p:pic>
+      <p:pic>
+        <p:nvPicPr>
+          <p:cNvPr id="9" name="Picture 8">
+            <a:extLst>
+              <a:ext uri="{FF2B5EF4-FFF2-40B4-BE49-F238E27FC236}">
+                <a16:creationId xmlns:a16="http://schemas.microsoft.com/office/drawing/2014/main" id="{EF5FA80E-CD16-40F0-9185-644DC792FE84}"/>
+              </a:ext>
+            </a:extLst>
+          </p:cNvPr>
+          <p:cNvPicPr>
+            <a:picLocks noChangeAspect="1"/>
+          </p:cNvPicPr>
+          <p:nvPr/>
+        </p:nvPicPr>
+        <p:blipFill>
+          <a:blip r:embed="rId3"/>
+          <a:stretch>
+            <a:fillRect/>
+          </a:stretch>
+        </p:blipFill>
+        <p:spPr>
+          <a:xfrm>
+            <a:off x="6649090" y="3715575"/>
+            <a:ext cx="5349555" cy="2193317"/>
+          </a:xfrm>
+          <a:prstGeom prst="rect">
+            <a:avLst/>
+          </a:prstGeom>
+        </p:spPr>
+      </p:pic>
     </p:spTree>
     <p:extLst>
       <p:ext uri="{BB962C8B-B14F-4D97-AF65-F5344CB8AC3E}">

</xml_diff>

<commit_message>
update with diff options
</commit_message>
<xml_diff>
--- a/github/Introduction to Git & GitHub.pptx
+++ b/github/Introduction to Git & GitHub.pptx
@@ -5,7 +5,7 @@
     <p:sldMasterId id="2147483707" r:id="rId1"/>
   </p:sldMasterIdLst>
   <p:notesMasterIdLst>
-    <p:notesMasterId r:id="rId44"/>
+    <p:notesMasterId r:id="rId46"/>
   </p:notesMasterIdLst>
   <p:sldIdLst>
     <p:sldId id="266" r:id="rId2"/>
@@ -32,24 +32,26 @@
     <p:sldId id="285" r:id="rId23"/>
     <p:sldId id="281" r:id="rId24"/>
     <p:sldId id="286" r:id="rId25"/>
-    <p:sldId id="282" r:id="rId26"/>
-    <p:sldId id="287" r:id="rId27"/>
-    <p:sldId id="283" r:id="rId28"/>
-    <p:sldId id="284" r:id="rId29"/>
-    <p:sldId id="297" r:id="rId30"/>
-    <p:sldId id="288" r:id="rId31"/>
-    <p:sldId id="302" r:id="rId32"/>
-    <p:sldId id="270" r:id="rId33"/>
-    <p:sldId id="292" r:id="rId34"/>
-    <p:sldId id="293" r:id="rId35"/>
-    <p:sldId id="295" r:id="rId36"/>
-    <p:sldId id="294" r:id="rId37"/>
-    <p:sldId id="299" r:id="rId38"/>
-    <p:sldId id="296" r:id="rId39"/>
-    <p:sldId id="300" r:id="rId40"/>
-    <p:sldId id="301" r:id="rId41"/>
-    <p:sldId id="298" r:id="rId42"/>
-    <p:sldId id="271" r:id="rId43"/>
+    <p:sldId id="303" r:id="rId26"/>
+    <p:sldId id="304" r:id="rId27"/>
+    <p:sldId id="282" r:id="rId28"/>
+    <p:sldId id="287" r:id="rId29"/>
+    <p:sldId id="283" r:id="rId30"/>
+    <p:sldId id="284" r:id="rId31"/>
+    <p:sldId id="297" r:id="rId32"/>
+    <p:sldId id="288" r:id="rId33"/>
+    <p:sldId id="302" r:id="rId34"/>
+    <p:sldId id="270" r:id="rId35"/>
+    <p:sldId id="292" r:id="rId36"/>
+    <p:sldId id="293" r:id="rId37"/>
+    <p:sldId id="295" r:id="rId38"/>
+    <p:sldId id="294" r:id="rId39"/>
+    <p:sldId id="299" r:id="rId40"/>
+    <p:sldId id="296" r:id="rId41"/>
+    <p:sldId id="300" r:id="rId42"/>
+    <p:sldId id="301" r:id="rId43"/>
+    <p:sldId id="298" r:id="rId44"/>
+    <p:sldId id="271" r:id="rId45"/>
   </p:sldIdLst>
   <p:sldSz cx="12192000" cy="6858000"/>
   <p:notesSz cx="6858000" cy="9144000"/>
@@ -238,7 +240,7 @@
           <a:p>
             <a:fld id="{D46E3B93-8523-4DBC-8FC5-65A9B9CDE5EE}" type="datetimeFigureOut">
               <a:rPr lang="en-US" smtClean="0"/>
-              <a:t>6/6/2019</a:t>
+              <a:t>6/12/2019</a:t>
             </a:fld>
             <a:endParaRPr lang="en-US"/>
           </a:p>
@@ -634,7 +636,7 @@
           <a:p>
             <a:fld id="{64A2D28A-44D6-4F71-B77F-AC810983F0F9}" type="datetime4">
               <a:rPr lang="en-US" smtClean="0"/>
-              <a:t>June 6, 2019</a:t>
+              <a:t>June 12, 2019</a:t>
             </a:fld>
             <a:endParaRPr lang="en-US" dirty="0"/>
           </a:p>
@@ -806,7 +808,7 @@
           <a:p>
             <a:fld id="{F74480E6-35C7-40E9-B6C1-E57DFD4DF83C}" type="datetime4">
               <a:rPr lang="en-US" smtClean="0"/>
-              <a:t>June 6, 2019</a:t>
+              <a:t>June 12, 2019</a:t>
             </a:fld>
             <a:endParaRPr lang="en-US" dirty="0"/>
           </a:p>
@@ -988,7 +990,7 @@
           <a:p>
             <a:fld id="{1A5552F4-4FE4-4E0E-936F-9158426B99E2}" type="datetime4">
               <a:rPr lang="en-US" smtClean="0"/>
-              <a:t>June 6, 2019</a:t>
+              <a:t>June 12, 2019</a:t>
             </a:fld>
             <a:endParaRPr lang="en-US" dirty="0"/>
           </a:p>
@@ -1171,7 +1173,7 @@
           <a:p>
             <a:fld id="{74F93749-3CD2-4A95-98ED-FE9E109683BE}" type="datetime4">
               <a:rPr lang="en-US" smtClean="0"/>
-              <a:t>June 6, 2019</a:t>
+              <a:t>June 12, 2019</a:t>
             </a:fld>
             <a:endParaRPr lang="en-US" dirty="0"/>
           </a:p>
@@ -1487,7 +1489,7 @@
           <a:p>
             <a:fld id="{930E186A-0FBF-4DA6-A71A-C325C944F843}" type="datetime4">
               <a:rPr lang="en-US" smtClean="0"/>
-              <a:t>June 6, 2019</a:t>
+              <a:t>June 12, 2019</a:t>
             </a:fld>
             <a:endParaRPr lang="en-US" dirty="0"/>
           </a:p>
@@ -1782,7 +1784,7 @@
           <a:p>
             <a:fld id="{3289D242-BAA3-4044-BDEF-2597A5A654EF}" type="datetime4">
               <a:rPr lang="en-US" smtClean="0"/>
-              <a:t>June 6, 2019</a:t>
+              <a:t>June 12, 2019</a:t>
             </a:fld>
             <a:endParaRPr lang="en-US" dirty="0"/>
           </a:p>
@@ -2150,7 +2152,7 @@
           <a:p>
             <a:fld id="{F2F0CD59-A5AD-4382-8C3D-D984415916E6}" type="datetime4">
               <a:rPr lang="en-US" smtClean="0"/>
-              <a:t>June 6, 2019</a:t>
+              <a:t>June 12, 2019</a:t>
             </a:fld>
             <a:endParaRPr lang="en-US" dirty="0"/>
           </a:p>
@@ -2271,7 +2273,7 @@
           <a:p>
             <a:fld id="{7CF69FE5-613D-4C74-96D7-27911459A362}" type="datetime4">
               <a:rPr lang="en-US" smtClean="0"/>
-              <a:t>June 6, 2019</a:t>
+              <a:t>June 12, 2019</a:t>
             </a:fld>
             <a:endParaRPr lang="en-US" dirty="0"/>
           </a:p>
@@ -2370,7 +2372,7 @@
           <a:p>
             <a:fld id="{A7A4566C-9F1F-4845-8842-8A0339049AF6}" type="datetime4">
               <a:rPr lang="en-US" smtClean="0"/>
-              <a:t>June 6, 2019</a:t>
+              <a:t>June 12, 2019</a:t>
             </a:fld>
             <a:endParaRPr lang="en-US" dirty="0"/>
           </a:p>
@@ -2649,7 +2651,7 @@
           <a:p>
             <a:fld id="{2E0CFB47-241B-48D4-BB7E-CF21A52B27C6}" type="datetime4">
               <a:rPr lang="en-US" smtClean="0"/>
-              <a:t>June 6, 2019</a:t>
+              <a:t>June 12, 2019</a:t>
             </a:fld>
             <a:endParaRPr lang="en-US" dirty="0"/>
           </a:p>
@@ -2908,7 +2910,7 @@
           <a:p>
             <a:fld id="{10045882-F850-4580-92A6-05497B2E8977}" type="datetime4">
               <a:rPr lang="en-US" smtClean="0"/>
-              <a:t>June 6, 2019</a:t>
+              <a:t>June 12, 2019</a:t>
             </a:fld>
             <a:endParaRPr lang="en-US" dirty="0"/>
           </a:p>
@@ -3126,7 +3128,7 @@
           <a:p>
             <a:fld id="{9EABF51D-0C08-4C4F-8D1C-BAC468AC6D9B}" type="datetime4">
               <a:rPr lang="en-US" smtClean="0"/>
-              <a:t>June 6, 2019</a:t>
+              <a:t>June 12, 2019</a:t>
             </a:fld>
             <a:endParaRPr lang="en-US" dirty="0"/>
           </a:p>
@@ -4030,7 +4032,7 @@
           <a:p>
             <a:fld id="{EBB345CB-8700-4516-A08B-C5962626710A}" type="datetime4">
               <a:rPr lang="en-US" smtClean="0"/>
-              <a:t>June 6, 2019</a:t>
+              <a:t>June 12, 2019</a:t>
             </a:fld>
             <a:endParaRPr lang="en-US" dirty="0"/>
           </a:p>
@@ -4181,7 +4183,7 @@
           <a:p>
             <a:fld id="{429314C5-54C3-45D4-BD43-1E6786BE277B}" type="datetime4">
               <a:rPr lang="en-US" smtClean="0"/>
-              <a:t>June 6, 2019</a:t>
+              <a:t>June 12, 2019</a:t>
             </a:fld>
             <a:endParaRPr lang="en-US" dirty="0"/>
           </a:p>
@@ -4389,7 +4391,7 @@
           <a:p>
             <a:fld id="{697056D7-45FA-4127-A77C-F084484F25E2}" type="datetime4">
               <a:rPr lang="en-US" smtClean="0"/>
-              <a:t>June 6, 2019</a:t>
+              <a:t>June 12, 2019</a:t>
             </a:fld>
             <a:endParaRPr lang="en-US" dirty="0"/>
           </a:p>
@@ -4607,7 +4609,7 @@
           <a:p>
             <a:fld id="{930E186A-0FBF-4DA6-A71A-C325C944F843}" type="datetime4">
               <a:rPr lang="en-US" smtClean="0"/>
-              <a:t>June 6, 2019</a:t>
+              <a:t>June 12, 2019</a:t>
             </a:fld>
             <a:endParaRPr lang="en-US" dirty="0"/>
           </a:p>
@@ -4866,7 +4868,7 @@
           <a:p>
             <a:fld id="{930E186A-0FBF-4DA6-A71A-C325C944F843}" type="datetime4">
               <a:rPr lang="en-US" smtClean="0"/>
-              <a:t>June 6, 2019</a:t>
+              <a:t>June 12, 2019</a:t>
             </a:fld>
             <a:endParaRPr lang="en-US" dirty="0"/>
           </a:p>
@@ -5095,7 +5097,7 @@
           <a:p>
             <a:fld id="{74F93749-3CD2-4A95-98ED-FE9E109683BE}" type="datetime4">
               <a:rPr lang="en-US" smtClean="0"/>
-              <a:t>June 6, 2019</a:t>
+              <a:t>June 12, 2019</a:t>
             </a:fld>
             <a:endParaRPr lang="en-US" dirty="0"/>
           </a:p>
@@ -5397,7 +5399,7 @@
           <a:p>
             <a:fld id="{74F93749-3CD2-4A95-98ED-FE9E109683BE}" type="datetime4">
               <a:rPr lang="en-US" smtClean="0"/>
-              <a:t>June 6, 2019</a:t>
+              <a:t>June 12, 2019</a:t>
             </a:fld>
             <a:endParaRPr lang="en-US" dirty="0"/>
           </a:p>
@@ -5587,7 +5589,7 @@
           <a:p>
             <a:fld id="{74F93749-3CD2-4A95-98ED-FE9E109683BE}" type="datetime4">
               <a:rPr lang="en-US" smtClean="0"/>
-              <a:t>June 6, 2019</a:t>
+              <a:t>June 12, 2019</a:t>
             </a:fld>
             <a:endParaRPr lang="en-US" dirty="0"/>
           </a:p>
@@ -5858,7 +5860,7 @@
           <a:p>
             <a:fld id="{74F93749-3CD2-4A95-98ED-FE9E109683BE}" type="datetime4">
               <a:rPr lang="en-US" smtClean="0"/>
-              <a:t>June 6, 2019</a:t>
+              <a:t>June 12, 2019</a:t>
             </a:fld>
             <a:endParaRPr lang="en-US" dirty="0"/>
           </a:p>
@@ -6031,7 +6033,7 @@
           <a:p>
             <a:fld id="{BC12CDDA-E02E-4D2B-B8BD-6E893F38A342}" type="datetime4">
               <a:rPr lang="en-US" smtClean="0"/>
-              <a:t>June 6, 2019</a:t>
+              <a:t>June 12, 2019</a:t>
             </a:fld>
             <a:endParaRPr lang="en-US" dirty="0"/>
           </a:p>
@@ -6268,7 +6270,7 @@
           <a:p>
             <a:fld id="{339FAF52-DB73-42B1-86E0-91EB4E09C484}" type="datetime4">
               <a:rPr lang="en-US" smtClean="0"/>
-              <a:t>June 6, 2019</a:t>
+              <a:t>June 12, 2019</a:t>
             </a:fld>
             <a:endParaRPr lang="en-US" dirty="0"/>
           </a:p>
@@ -6447,7 +6449,7 @@
           <a:p>
             <a:fld id="{930E186A-0FBF-4DA6-A71A-C325C944F843}" type="datetime4">
               <a:rPr lang="en-US" smtClean="0"/>
-              <a:t>June 6, 2019</a:t>
+              <a:t>June 12, 2019</a:t>
             </a:fld>
             <a:endParaRPr lang="en-US" dirty="0"/>
           </a:p>
@@ -6695,7 +6697,7 @@
           <a:p>
             <a:fld id="{74F93749-3CD2-4A95-98ED-FE9E109683BE}" type="datetime4">
               <a:rPr lang="en-US" smtClean="0"/>
-              <a:t>June 6, 2019</a:t>
+              <a:t>June 12, 2019</a:t>
             </a:fld>
             <a:endParaRPr lang="en-US" dirty="0"/>
           </a:p>
@@ -6901,7 +6903,7 @@
           <a:p>
             <a:fld id="{74F93749-3CD2-4A95-98ED-FE9E109683BE}" type="datetime4">
               <a:rPr lang="en-US" smtClean="0"/>
-              <a:t>June 6, 2019</a:t>
+              <a:t>June 12, 2019</a:t>
             </a:fld>
             <a:endParaRPr lang="en-US" dirty="0"/>
           </a:p>
@@ -7159,7 +7161,7 @@
           <a:p>
             <a:fld id="{74F93749-3CD2-4A95-98ED-FE9E109683BE}" type="datetime4">
               <a:rPr lang="en-US" smtClean="0"/>
-              <a:t>June 6, 2019</a:t>
+              <a:t>June 12, 2019</a:t>
             </a:fld>
             <a:endParaRPr lang="en-US" dirty="0"/>
           </a:p>
@@ -7353,11 +7355,7 @@
           <a:p>
             <a:r>
               <a:rPr lang="en-US" dirty="0"/>
-              <a:t>Monitor </a:t>
-            </a:r>
-            <a:r>
-              <a:rPr lang="en-US" dirty="0"/>
-              <a:t>c</a:t>
+              <a:t>Monitor c</a:t>
             </a:r>
             <a:r>
               <a:rPr lang="en-US" dirty="0" smtClean="0"/>
@@ -7405,7 +7403,7 @@
           <a:p>
             <a:fld id="{74F93749-3CD2-4A95-98ED-FE9E109683BE}" type="datetime4">
               <a:rPr lang="en-US" smtClean="0"/>
-              <a:t>June 6, 2019</a:t>
+              <a:t>June 12, 2019</a:t>
             </a:fld>
             <a:endParaRPr lang="en-US" dirty="0"/>
           </a:p>
@@ -7611,6 +7609,511 @@
           <a:lstStyle/>
           <a:p>
             <a:r>
+              <a:rPr lang="en-US" dirty="0" smtClean="0"/>
+              <a:t>VIEWING CHANGES: IMAGES</a:t>
+            </a:r>
+            <a:endParaRPr lang="en-US" dirty="0"/>
+          </a:p>
+        </p:txBody>
+      </p:sp>
+      <p:sp>
+        <p:nvSpPr>
+          <p:cNvPr id="3" name="Content Placeholder 2"/>
+          <p:cNvSpPr>
+            <a:spLocks noGrp="1"/>
+          </p:cNvSpPr>
+          <p:nvPr>
+            <p:ph idx="1"/>
+          </p:nvPr>
+        </p:nvSpPr>
+        <p:spPr>
+          <a:xfrm>
+            <a:off x="838200" y="1825625"/>
+            <a:ext cx="4953000" cy="4351338"/>
+          </a:xfrm>
+        </p:spPr>
+        <p:txBody>
+          <a:bodyPr/>
+          <a:lstStyle/>
+          <a:p>
+            <a:r>
+              <a:rPr lang="en-US" dirty="0" smtClean="0"/>
+              <a:t>2-Up: side-by-side</a:t>
+            </a:r>
+          </a:p>
+          <a:p>
+            <a:r>
+              <a:rPr lang="en-US" dirty="0" smtClean="0"/>
+              <a:t>Swipe: left of divider is first image, right is second image</a:t>
+            </a:r>
+          </a:p>
+          <a:p>
+            <a:r>
+              <a:rPr lang="en-US" dirty="0" smtClean="0"/>
+              <a:t>Onion Peel: images are overlaid, slider changes transparency setting</a:t>
+            </a:r>
+            <a:endParaRPr lang="en-US" dirty="0"/>
+          </a:p>
+        </p:txBody>
+      </p:sp>
+      <p:sp>
+        <p:nvSpPr>
+          <p:cNvPr id="4" name="Date Placeholder 3"/>
+          <p:cNvSpPr>
+            <a:spLocks noGrp="1"/>
+          </p:cNvSpPr>
+          <p:nvPr>
+            <p:ph type="dt" sz="half" idx="10"/>
+          </p:nvPr>
+        </p:nvSpPr>
+        <p:spPr/>
+        <p:txBody>
+          <a:bodyPr/>
+          <a:lstStyle/>
+          <a:p>
+            <a:fld id="{74F93749-3CD2-4A95-98ED-FE9E109683BE}" type="datetime4">
+              <a:rPr lang="en-US" smtClean="0"/>
+              <a:t>June 12, 2019</a:t>
+            </a:fld>
+            <a:endParaRPr lang="en-US" dirty="0"/>
+          </a:p>
+        </p:txBody>
+      </p:sp>
+      <p:sp>
+        <p:nvSpPr>
+          <p:cNvPr id="5" name="Footer Placeholder 4"/>
+          <p:cNvSpPr>
+            <a:spLocks noGrp="1"/>
+          </p:cNvSpPr>
+          <p:nvPr>
+            <p:ph type="ftr" sz="quarter" idx="11"/>
+          </p:nvPr>
+        </p:nvSpPr>
+        <p:spPr/>
+        <p:txBody>
+          <a:bodyPr/>
+          <a:lstStyle/>
+          <a:p>
+            <a:r>
+              <a:rPr lang="en-US" smtClean="0"/>
+              <a:t>Digital Scholarship Services </a:t>
+            </a:r>
+            <a:r>
+              <a:rPr lang="en-US" smtClean="0">
+                <a:solidFill>
+                  <a:schemeClr val="accent1">
+                    <a:lumMod val="50000"/>
+                  </a:schemeClr>
+                </a:solidFill>
+              </a:rPr>
+              <a:t>| Email</a:t>
+            </a:r>
+            <a:r>
+              <a:rPr lang="en-US" smtClean="0"/>
+              <a:t> cf24@rice.edu </a:t>
+            </a:r>
+            <a:r>
+              <a:rPr lang="en-US" smtClean="0">
+                <a:solidFill>
+                  <a:schemeClr val="accent1">
+                    <a:lumMod val="50000"/>
+                  </a:schemeClr>
+                </a:solidFill>
+              </a:rPr>
+              <a:t>|</a:t>
+            </a:r>
+            <a:r>
+              <a:rPr lang="en-US" smtClean="0"/>
+              <a:t> library.rice.edu/dss</a:t>
+            </a:r>
+            <a:endParaRPr lang="en-US" dirty="0"/>
+          </a:p>
+        </p:txBody>
+      </p:sp>
+      <p:sp>
+        <p:nvSpPr>
+          <p:cNvPr id="6" name="Slide Number Placeholder 5"/>
+          <p:cNvSpPr>
+            <a:spLocks noGrp="1"/>
+          </p:cNvSpPr>
+          <p:nvPr>
+            <p:ph type="sldNum" sz="quarter" idx="12"/>
+          </p:nvPr>
+        </p:nvSpPr>
+        <p:spPr/>
+        <p:txBody>
+          <a:bodyPr/>
+          <a:lstStyle/>
+          <a:p>
+            <a:fld id="{D57F1E4F-1CFF-5643-939E-02111984F565}" type="slidenum">
+              <a:rPr lang="en-US" smtClean="0"/>
+              <a:t>25</a:t>
+            </a:fld>
+            <a:endParaRPr lang="en-US" dirty="0"/>
+          </a:p>
+        </p:txBody>
+      </p:sp>
+      <p:pic>
+        <p:nvPicPr>
+          <p:cNvPr id="7" name="Picture 6"/>
+          <p:cNvPicPr>
+            <a:picLocks noChangeAspect="1"/>
+          </p:cNvPicPr>
+          <p:nvPr/>
+        </p:nvPicPr>
+        <p:blipFill>
+          <a:blip r:embed="rId2"/>
+          <a:stretch>
+            <a:fillRect/>
+          </a:stretch>
+        </p:blipFill>
+        <p:spPr>
+          <a:xfrm>
+            <a:off x="5639752" y="1967690"/>
+            <a:ext cx="6124575" cy="4067207"/>
+          </a:xfrm>
+          <a:prstGeom prst="rect">
+            <a:avLst/>
+          </a:prstGeom>
+        </p:spPr>
+      </p:pic>
+    </p:spTree>
+    <p:extLst>
+      <p:ext uri="{BB962C8B-B14F-4D97-AF65-F5344CB8AC3E}">
+        <p14:creationId xmlns:p14="http://schemas.microsoft.com/office/powerpoint/2010/main" val="2592335789"/>
+      </p:ext>
+    </p:extLst>
+  </p:cSld>
+  <p:clrMapOvr>
+    <a:masterClrMapping/>
+  </p:clrMapOvr>
+</p:sld>
+</file>
+
+<file path=ppt/slides/slide26.xml><?xml version="1.0" encoding="utf-8"?>
+<p:sld xmlns:a="http://schemas.openxmlformats.org/drawingml/2006/main" xmlns:r="http://schemas.openxmlformats.org/officeDocument/2006/relationships" xmlns:p="http://schemas.openxmlformats.org/presentationml/2006/main">
+  <p:cSld>
+    <p:spTree>
+      <p:nvGrpSpPr>
+        <p:cNvPr id="1" name=""/>
+        <p:cNvGrpSpPr/>
+        <p:nvPr/>
+      </p:nvGrpSpPr>
+      <p:grpSpPr>
+        <a:xfrm>
+          <a:off x="0" y="0"/>
+          <a:ext cx="0" cy="0"/>
+          <a:chOff x="0" y="0"/>
+          <a:chExt cx="0" cy="0"/>
+        </a:xfrm>
+      </p:grpSpPr>
+      <p:sp>
+        <p:nvSpPr>
+          <p:cNvPr id="2" name="Title 1"/>
+          <p:cNvSpPr>
+            <a:spLocks noGrp="1"/>
+          </p:cNvSpPr>
+          <p:nvPr>
+            <p:ph type="title"/>
+          </p:nvPr>
+        </p:nvSpPr>
+        <p:spPr/>
+        <p:txBody>
+          <a:bodyPr/>
+          <a:lstStyle/>
+          <a:p>
+            <a:r>
+              <a:rPr lang="en-US" dirty="0" smtClean="0"/>
+              <a:t>VIEWING CHANGES: DOCUMENTS</a:t>
+            </a:r>
+            <a:endParaRPr lang="en-US" dirty="0"/>
+          </a:p>
+        </p:txBody>
+      </p:sp>
+      <p:sp>
+        <p:nvSpPr>
+          <p:cNvPr id="3" name="Content Placeholder 2"/>
+          <p:cNvSpPr>
+            <a:spLocks noGrp="1"/>
+          </p:cNvSpPr>
+          <p:nvPr>
+            <p:ph idx="1"/>
+          </p:nvPr>
+        </p:nvSpPr>
+        <p:spPr/>
+        <p:txBody>
+          <a:bodyPr/>
+          <a:lstStyle/>
+          <a:p>
+            <a:r>
+              <a:rPr lang="en-US" dirty="0" smtClean="0"/>
+              <a:t>Prose Diff: see word-by-word changes in formatting</a:t>
+            </a:r>
+            <a:endParaRPr lang="en-US" dirty="0"/>
+          </a:p>
+        </p:txBody>
+      </p:sp>
+      <p:sp>
+        <p:nvSpPr>
+          <p:cNvPr id="4" name="Date Placeholder 3"/>
+          <p:cNvSpPr>
+            <a:spLocks noGrp="1"/>
+          </p:cNvSpPr>
+          <p:nvPr>
+            <p:ph type="dt" sz="half" idx="10"/>
+          </p:nvPr>
+        </p:nvSpPr>
+        <p:spPr/>
+        <p:txBody>
+          <a:bodyPr/>
+          <a:lstStyle/>
+          <a:p>
+            <a:fld id="{74F93749-3CD2-4A95-98ED-FE9E109683BE}" type="datetime4">
+              <a:rPr lang="en-US" smtClean="0"/>
+              <a:t>June 12, 2019</a:t>
+            </a:fld>
+            <a:endParaRPr lang="en-US" dirty="0"/>
+          </a:p>
+        </p:txBody>
+      </p:sp>
+      <p:sp>
+        <p:nvSpPr>
+          <p:cNvPr id="5" name="Footer Placeholder 4"/>
+          <p:cNvSpPr>
+            <a:spLocks noGrp="1"/>
+          </p:cNvSpPr>
+          <p:nvPr>
+            <p:ph type="ftr" sz="quarter" idx="11"/>
+          </p:nvPr>
+        </p:nvSpPr>
+        <p:spPr/>
+        <p:txBody>
+          <a:bodyPr/>
+          <a:lstStyle/>
+          <a:p>
+            <a:r>
+              <a:rPr lang="en-US" smtClean="0"/>
+              <a:t>Digital Scholarship Services </a:t>
+            </a:r>
+            <a:r>
+              <a:rPr lang="en-US" smtClean="0">
+                <a:solidFill>
+                  <a:schemeClr val="accent1">
+                    <a:lumMod val="50000"/>
+                  </a:schemeClr>
+                </a:solidFill>
+              </a:rPr>
+              <a:t>| Email</a:t>
+            </a:r>
+            <a:r>
+              <a:rPr lang="en-US" smtClean="0"/>
+              <a:t> cf24@rice.edu </a:t>
+            </a:r>
+            <a:r>
+              <a:rPr lang="en-US" smtClean="0">
+                <a:solidFill>
+                  <a:schemeClr val="accent1">
+                    <a:lumMod val="50000"/>
+                  </a:schemeClr>
+                </a:solidFill>
+              </a:rPr>
+              <a:t>|</a:t>
+            </a:r>
+            <a:r>
+              <a:rPr lang="en-US" smtClean="0"/>
+              <a:t> library.rice.edu/dss</a:t>
+            </a:r>
+            <a:endParaRPr lang="en-US" dirty="0"/>
+          </a:p>
+        </p:txBody>
+      </p:sp>
+      <p:sp>
+        <p:nvSpPr>
+          <p:cNvPr id="6" name="Slide Number Placeholder 5"/>
+          <p:cNvSpPr>
+            <a:spLocks noGrp="1"/>
+          </p:cNvSpPr>
+          <p:nvPr>
+            <p:ph type="sldNum" sz="quarter" idx="12"/>
+          </p:nvPr>
+        </p:nvSpPr>
+        <p:spPr/>
+        <p:txBody>
+          <a:bodyPr/>
+          <a:lstStyle/>
+          <a:p>
+            <a:fld id="{D57F1E4F-1CFF-5643-939E-02111984F565}" type="slidenum">
+              <a:rPr lang="en-US" smtClean="0"/>
+              <a:t>26</a:t>
+            </a:fld>
+            <a:endParaRPr lang="en-US" dirty="0"/>
+          </a:p>
+        </p:txBody>
+      </p:sp>
+      <p:pic>
+        <p:nvPicPr>
+          <p:cNvPr id="7" name="Picture 6"/>
+          <p:cNvPicPr>
+            <a:picLocks noChangeAspect="1"/>
+          </p:cNvPicPr>
+          <p:nvPr/>
+        </p:nvPicPr>
+        <p:blipFill>
+          <a:blip r:embed="rId2"/>
+          <a:stretch>
+            <a:fillRect/>
+          </a:stretch>
+        </p:blipFill>
+        <p:spPr>
+          <a:xfrm>
+            <a:off x="7077075" y="2396331"/>
+            <a:ext cx="4276725" cy="3209925"/>
+          </a:xfrm>
+          <a:prstGeom prst="rect">
+            <a:avLst/>
+          </a:prstGeom>
+        </p:spPr>
+      </p:pic>
+      <p:pic>
+        <p:nvPicPr>
+          <p:cNvPr id="8" name="Picture 7"/>
+          <p:cNvPicPr>
+            <a:picLocks noChangeAspect="1"/>
+          </p:cNvPicPr>
+          <p:nvPr/>
+        </p:nvPicPr>
+        <p:blipFill>
+          <a:blip r:embed="rId3"/>
+          <a:stretch>
+            <a:fillRect/>
+          </a:stretch>
+        </p:blipFill>
+        <p:spPr>
+          <a:xfrm>
+            <a:off x="1540192" y="2396331"/>
+            <a:ext cx="3457575" cy="1304925"/>
+          </a:xfrm>
+          <a:prstGeom prst="rect">
+            <a:avLst/>
+          </a:prstGeom>
+        </p:spPr>
+      </p:pic>
+      <p:pic>
+        <p:nvPicPr>
+          <p:cNvPr id="9" name="Picture 8"/>
+          <p:cNvPicPr>
+            <a:picLocks noChangeAspect="1"/>
+          </p:cNvPicPr>
+          <p:nvPr/>
+        </p:nvPicPr>
+        <p:blipFill>
+          <a:blip r:embed="rId4"/>
+          <a:stretch>
+            <a:fillRect/>
+          </a:stretch>
+        </p:blipFill>
+        <p:spPr>
+          <a:xfrm>
+            <a:off x="1540191" y="3880643"/>
+            <a:ext cx="3457575" cy="1864760"/>
+          </a:xfrm>
+          <a:prstGeom prst="rect">
+            <a:avLst/>
+          </a:prstGeom>
+        </p:spPr>
+      </p:pic>
+      <p:sp>
+        <p:nvSpPr>
+          <p:cNvPr id="10" name="Right Arrow 9"/>
+          <p:cNvSpPr/>
+          <p:nvPr/>
+        </p:nvSpPr>
+        <p:spPr>
+          <a:xfrm>
+            <a:off x="5318760" y="3406933"/>
+            <a:ext cx="1554480" cy="1188720"/>
+          </a:xfrm>
+          <a:prstGeom prst="rightArrow">
+            <a:avLst/>
+          </a:prstGeom>
+          <a:noFill/>
+          <a:ln w="28575">
+            <a:solidFill>
+              <a:schemeClr val="tx1"/>
+            </a:solidFill>
+          </a:ln>
+        </p:spPr>
+        <p:style>
+          <a:lnRef idx="2">
+            <a:schemeClr val="accent1">
+              <a:shade val="50000"/>
+            </a:schemeClr>
+          </a:lnRef>
+          <a:fillRef idx="1">
+            <a:schemeClr val="accent1"/>
+          </a:fillRef>
+          <a:effectRef idx="0">
+            <a:schemeClr val="accent1"/>
+          </a:effectRef>
+          <a:fontRef idx="minor">
+            <a:schemeClr val="lt1"/>
+          </a:fontRef>
+        </p:style>
+        <p:txBody>
+          <a:bodyPr rtlCol="0" anchor="ctr"/>
+          <a:lstStyle/>
+          <a:p>
+            <a:pPr algn="ctr"/>
+            <a:endParaRPr lang="en-US"/>
+          </a:p>
+        </p:txBody>
+      </p:sp>
+    </p:spTree>
+    <p:extLst>
+      <p:ext uri="{BB962C8B-B14F-4D97-AF65-F5344CB8AC3E}">
+        <p14:creationId xmlns:p14="http://schemas.microsoft.com/office/powerpoint/2010/main" val="2113835148"/>
+      </p:ext>
+    </p:extLst>
+  </p:cSld>
+  <p:clrMapOvr>
+    <a:masterClrMapping/>
+  </p:clrMapOvr>
+</p:sld>
+</file>
+
+<file path=ppt/slides/slide27.xml><?xml version="1.0" encoding="utf-8"?>
+<p:sld xmlns:a="http://schemas.openxmlformats.org/drawingml/2006/main" xmlns:r="http://schemas.openxmlformats.org/officeDocument/2006/relationships" xmlns:p="http://schemas.openxmlformats.org/presentationml/2006/main">
+  <p:cSld>
+    <p:spTree>
+      <p:nvGrpSpPr>
+        <p:cNvPr id="1" name=""/>
+        <p:cNvGrpSpPr/>
+        <p:nvPr/>
+      </p:nvGrpSpPr>
+      <p:grpSpPr>
+        <a:xfrm>
+          <a:off x="0" y="0"/>
+          <a:ext cx="0" cy="0"/>
+          <a:chOff x="0" y="0"/>
+          <a:chExt cx="0" cy="0"/>
+        </a:xfrm>
+      </p:grpSpPr>
+      <p:sp>
+        <p:nvSpPr>
+          <p:cNvPr id="2" name="Title 1"/>
+          <p:cNvSpPr>
+            <a:spLocks noGrp="1"/>
+          </p:cNvSpPr>
+          <p:nvPr>
+            <p:ph type="title"/>
+          </p:nvPr>
+        </p:nvSpPr>
+        <p:spPr/>
+        <p:txBody>
+          <a:bodyPr/>
+          <a:lstStyle/>
+          <a:p>
+            <a:r>
               <a:rPr lang="en-US" dirty="0"/>
               <a:t>TELLING GIT ABOUT OUR CHANGES</a:t>
             </a:r>
@@ -7705,7 +8208,7 @@
           <a:p>
             <a:fld id="{74F93749-3CD2-4A95-98ED-FE9E109683BE}" type="datetime4">
               <a:rPr lang="en-US" smtClean="0"/>
-              <a:t>June 6, 2019</a:t>
+              <a:t>June 12, 2019</a:t>
             </a:fld>
             <a:endParaRPr lang="en-US" dirty="0"/>
           </a:p>
@@ -7779,7 +8282,7 @@
           <a:p>
             <a:fld id="{D57F1E4F-1CFF-5643-939E-02111984F565}" type="slidenum">
               <a:rPr lang="en-US" smtClean="0"/>
-              <a:t>25</a:t>
+              <a:t>27</a:t>
             </a:fld>
             <a:endParaRPr lang="en-US" dirty="0"/>
           </a:p>
@@ -7822,7 +8325,7 @@
 </p:sld>
 </file>
 
-<file path=ppt/slides/slide26.xml><?xml version="1.0" encoding="utf-8"?>
+<file path=ppt/slides/slide28.xml><?xml version="1.0" encoding="utf-8"?>
 <p:sld xmlns:a="http://schemas.openxmlformats.org/drawingml/2006/main" xmlns:r="http://schemas.openxmlformats.org/officeDocument/2006/relationships" xmlns:p="http://schemas.openxmlformats.org/presentationml/2006/main">
   <p:cSld>
     <p:spTree>
@@ -7947,7 +8450,7 @@
           <a:p>
             <a:fld id="{74F93749-3CD2-4A95-98ED-FE9E109683BE}" type="datetime4">
               <a:rPr lang="en-US" smtClean="0"/>
-              <a:t>June 6, 2019</a:t>
+              <a:t>June 12, 2019</a:t>
             </a:fld>
             <a:endParaRPr lang="en-US" dirty="0"/>
           </a:p>
@@ -8021,7 +8524,7 @@
           <a:p>
             <a:fld id="{D57F1E4F-1CFF-5643-939E-02111984F565}" type="slidenum">
               <a:rPr lang="en-US" smtClean="0"/>
-              <a:t>26</a:t>
+              <a:t>28</a:t>
             </a:fld>
             <a:endParaRPr lang="en-US" dirty="0"/>
           </a:p>
@@ -8081,7 +8584,7 @@
 </p:sld>
 </file>
 
-<file path=ppt/slides/slide27.xml><?xml version="1.0" encoding="utf-8"?>
+<file path=ppt/slides/slide29.xml><?xml version="1.0" encoding="utf-8"?>
 <p:sld xmlns:a="http://schemas.openxmlformats.org/drawingml/2006/main" xmlns:r="http://schemas.openxmlformats.org/officeDocument/2006/relationships" xmlns:p="http://schemas.openxmlformats.org/presentationml/2006/main">
   <p:cSld>
     <p:spTree>
@@ -8220,7 +8723,7 @@
           <a:p>
             <a:fld id="{74F93749-3CD2-4A95-98ED-FE9E109683BE}" type="datetime4">
               <a:rPr lang="en-US" smtClean="0"/>
-              <a:t>June 6, 2019</a:t>
+              <a:t>June 12, 2019</a:t>
             </a:fld>
             <a:endParaRPr lang="en-US" dirty="0"/>
           </a:p>
@@ -8294,7 +8797,7 @@
           <a:p>
             <a:fld id="{D57F1E4F-1CFF-5643-939E-02111984F565}" type="slidenum">
               <a:rPr lang="en-US" smtClean="0"/>
-              <a:t>27</a:t>
+              <a:t>29</a:t>
             </a:fld>
             <a:endParaRPr lang="en-US" dirty="0"/>
           </a:p>
@@ -8337,410 +8840,6 @@
 </p:sld>
 </file>
 
-<file path=ppt/slides/slide28.xml><?xml version="1.0" encoding="utf-8"?>
-<p:sld xmlns:a="http://schemas.openxmlformats.org/drawingml/2006/main" xmlns:r="http://schemas.openxmlformats.org/officeDocument/2006/relationships" xmlns:p="http://schemas.openxmlformats.org/presentationml/2006/main">
-  <p:cSld>
-    <p:spTree>
-      <p:nvGrpSpPr>
-        <p:cNvPr id="1" name=""/>
-        <p:cNvGrpSpPr/>
-        <p:nvPr/>
-      </p:nvGrpSpPr>
-      <p:grpSpPr>
-        <a:xfrm>
-          <a:off x="0" y="0"/>
-          <a:ext cx="0" cy="0"/>
-          <a:chOff x="0" y="0"/>
-          <a:chExt cx="0" cy="0"/>
-        </a:xfrm>
-      </p:grpSpPr>
-      <p:sp>
-        <p:nvSpPr>
-          <p:cNvPr id="2" name="Title 1"/>
-          <p:cNvSpPr>
-            <a:spLocks noGrp="1"/>
-          </p:cNvSpPr>
-          <p:nvPr>
-            <p:ph type="title"/>
-          </p:nvPr>
-        </p:nvSpPr>
-        <p:spPr/>
-        <p:txBody>
-          <a:bodyPr/>
-          <a:lstStyle/>
-          <a:p>
-            <a:r>
-              <a:rPr lang="en-US" dirty="0"/>
-              <a:t>UPLOADING OUR CHANGES</a:t>
-            </a:r>
-          </a:p>
-        </p:txBody>
-      </p:sp>
-      <p:sp>
-        <p:nvSpPr>
-          <p:cNvPr id="3" name="Content Placeholder 2"/>
-          <p:cNvSpPr>
-            <a:spLocks noGrp="1"/>
-          </p:cNvSpPr>
-          <p:nvPr>
-            <p:ph idx="1"/>
-          </p:nvPr>
-        </p:nvSpPr>
-        <p:spPr>
-          <a:xfrm>
-            <a:off x="838200" y="1825625"/>
-            <a:ext cx="5063138" cy="4351338"/>
-          </a:xfrm>
-        </p:spPr>
-        <p:txBody>
-          <a:bodyPr/>
-          <a:lstStyle/>
-          <a:p>
-            <a:r>
-              <a:rPr lang="en-US" dirty="0"/>
-              <a:t>Once we have a commit, we can send it to GitHub</a:t>
-            </a:r>
-          </a:p>
-          <a:p>
-            <a:r>
-              <a:rPr lang="en-US" dirty="0"/>
-              <a:t>This is called a </a:t>
-            </a:r>
-            <a:r>
-              <a:rPr lang="en-US" b="1" dirty="0"/>
-              <a:t>push</a:t>
-            </a:r>
-          </a:p>
-          <a:p>
-            <a:r>
-              <a:rPr lang="en-US" dirty="0"/>
-              <a:t>Note: Changes are not sent to the server by default!</a:t>
-            </a:r>
-          </a:p>
-        </p:txBody>
-      </p:sp>
-      <p:sp>
-        <p:nvSpPr>
-          <p:cNvPr id="4" name="Date Placeholder 3"/>
-          <p:cNvSpPr>
-            <a:spLocks noGrp="1"/>
-          </p:cNvSpPr>
-          <p:nvPr>
-            <p:ph type="dt" sz="half" idx="10"/>
-          </p:nvPr>
-        </p:nvSpPr>
-        <p:spPr/>
-        <p:txBody>
-          <a:bodyPr/>
-          <a:lstStyle/>
-          <a:p>
-            <a:fld id="{74F93749-3CD2-4A95-98ED-FE9E109683BE}" type="datetime4">
-              <a:rPr lang="en-US" smtClean="0"/>
-              <a:t>June 6, 2019</a:t>
-            </a:fld>
-            <a:endParaRPr lang="en-US" dirty="0"/>
-          </a:p>
-        </p:txBody>
-      </p:sp>
-      <p:sp>
-        <p:nvSpPr>
-          <p:cNvPr id="5" name="Footer Placeholder 4"/>
-          <p:cNvSpPr>
-            <a:spLocks noGrp="1"/>
-          </p:cNvSpPr>
-          <p:nvPr>
-            <p:ph type="ftr" sz="quarter" idx="11"/>
-          </p:nvPr>
-        </p:nvSpPr>
-        <p:spPr/>
-        <p:txBody>
-          <a:bodyPr/>
-          <a:lstStyle/>
-          <a:p>
-            <a:r>
-              <a:rPr lang="en-US"/>
-              <a:t>Digital Scholarship Services </a:t>
-            </a:r>
-            <a:r>
-              <a:rPr lang="en-US">
-                <a:solidFill>
-                  <a:schemeClr val="accent1">
-                    <a:lumMod val="50000"/>
-                  </a:schemeClr>
-                </a:solidFill>
-              </a:rPr>
-              <a:t>| Email</a:t>
-            </a:r>
-            <a:r>
-              <a:rPr lang="en-US"/>
-              <a:t> cf24@rice.edu </a:t>
-            </a:r>
-            <a:r>
-              <a:rPr lang="en-US">
-                <a:solidFill>
-                  <a:schemeClr val="accent1">
-                    <a:lumMod val="50000"/>
-                  </a:schemeClr>
-                </a:solidFill>
-              </a:rPr>
-              <a:t>|</a:t>
-            </a:r>
-            <a:r>
-              <a:rPr lang="en-US"/>
-              <a:t> library.rice.edu/dss</a:t>
-            </a:r>
-            <a:endParaRPr lang="en-US" dirty="0"/>
-          </a:p>
-        </p:txBody>
-      </p:sp>
-      <p:sp>
-        <p:nvSpPr>
-          <p:cNvPr id="6" name="Slide Number Placeholder 5"/>
-          <p:cNvSpPr>
-            <a:spLocks noGrp="1"/>
-          </p:cNvSpPr>
-          <p:nvPr>
-            <p:ph type="sldNum" sz="quarter" idx="12"/>
-          </p:nvPr>
-        </p:nvSpPr>
-        <p:spPr/>
-        <p:txBody>
-          <a:bodyPr/>
-          <a:lstStyle/>
-          <a:p>
-            <a:fld id="{D57F1E4F-1CFF-5643-939E-02111984F565}" type="slidenum">
-              <a:rPr lang="en-US" smtClean="0"/>
-              <a:t>28</a:t>
-            </a:fld>
-            <a:endParaRPr lang="en-US" dirty="0"/>
-          </a:p>
-        </p:txBody>
-      </p:sp>
-      <p:pic>
-        <p:nvPicPr>
-          <p:cNvPr id="8194" name="Picture 2" descr="push.PNG"/>
-          <p:cNvPicPr>
-            <a:picLocks noChangeAspect="1" noChangeArrowheads="1"/>
-          </p:cNvPicPr>
-          <p:nvPr/>
-        </p:nvPicPr>
-        <p:blipFill>
-          <a:blip r:embed="rId2">
-            <a:extLst>
-              <a:ext uri="{28A0092B-C50C-407E-A947-70E740481C1C}">
-                <a14:useLocalDpi xmlns:a14="http://schemas.microsoft.com/office/drawing/2010/main" val="0"/>
-              </a:ext>
-            </a:extLst>
-          </a:blip>
-          <a:srcRect/>
-          <a:stretch>
-            <a:fillRect/>
-          </a:stretch>
-        </p:blipFill>
-        <p:spPr bwMode="auto">
-          <a:xfrm>
-            <a:off x="6096000" y="1825625"/>
-            <a:ext cx="5618209" cy="4111022"/>
-          </a:xfrm>
-          <a:prstGeom prst="rect">
-            <a:avLst/>
-          </a:prstGeom>
-          <a:noFill/>
-          <a:extLst>
-            <a:ext uri="{909E8E84-426E-40DD-AFC4-6F175D3DCCD1}">
-              <a14:hiddenFill xmlns:a14="http://schemas.microsoft.com/office/drawing/2010/main">
-                <a:solidFill>
-                  <a:srgbClr val="FFFFFF"/>
-                </a:solidFill>
-              </a14:hiddenFill>
-            </a:ext>
-          </a:extLst>
-        </p:spPr>
-      </p:pic>
-    </p:spTree>
-    <p:extLst>
-      <p:ext uri="{BB962C8B-B14F-4D97-AF65-F5344CB8AC3E}">
-        <p14:creationId xmlns:p14="http://schemas.microsoft.com/office/powerpoint/2010/main" val="366690583"/>
-      </p:ext>
-    </p:extLst>
-  </p:cSld>
-  <p:clrMapOvr>
-    <a:masterClrMapping/>
-  </p:clrMapOvr>
-</p:sld>
-</file>
-
-<file path=ppt/slides/slide29.xml><?xml version="1.0" encoding="utf-8"?>
-<p:sld xmlns:a="http://schemas.openxmlformats.org/drawingml/2006/main" xmlns:r="http://schemas.openxmlformats.org/officeDocument/2006/relationships" xmlns:p="http://schemas.openxmlformats.org/presentationml/2006/main">
-  <p:cSld>
-    <p:spTree>
-      <p:nvGrpSpPr>
-        <p:cNvPr id="1" name=""/>
-        <p:cNvGrpSpPr/>
-        <p:nvPr/>
-      </p:nvGrpSpPr>
-      <p:grpSpPr>
-        <a:xfrm>
-          <a:off x="0" y="0"/>
-          <a:ext cx="0" cy="0"/>
-          <a:chOff x="0" y="0"/>
-          <a:chExt cx="0" cy="0"/>
-        </a:xfrm>
-      </p:grpSpPr>
-      <p:sp>
-        <p:nvSpPr>
-          <p:cNvPr id="2" name="Title 1"/>
-          <p:cNvSpPr>
-            <a:spLocks noGrp="1"/>
-          </p:cNvSpPr>
-          <p:nvPr>
-            <p:ph type="title"/>
-          </p:nvPr>
-        </p:nvSpPr>
-        <p:spPr/>
-        <p:txBody>
-          <a:bodyPr/>
-          <a:lstStyle/>
-          <a:p>
-            <a:r>
-              <a:rPr lang="en-US" dirty="0"/>
-              <a:t>UPLOADING OUR CHANGES</a:t>
-            </a:r>
-          </a:p>
-        </p:txBody>
-      </p:sp>
-      <p:sp>
-        <p:nvSpPr>
-          <p:cNvPr id="3" name="Content Placeholder 2"/>
-          <p:cNvSpPr>
-            <a:spLocks noGrp="1"/>
-          </p:cNvSpPr>
-          <p:nvPr>
-            <p:ph idx="1"/>
-          </p:nvPr>
-        </p:nvSpPr>
-        <p:spPr/>
-        <p:txBody>
-          <a:bodyPr/>
-          <a:lstStyle/>
-          <a:p>
-            <a:r>
-              <a:rPr lang="en-US" dirty="0"/>
-              <a:t>From the repository cloned earlier, upload a file with any message you like!</a:t>
-            </a:r>
-          </a:p>
-        </p:txBody>
-      </p:sp>
-      <p:sp>
-        <p:nvSpPr>
-          <p:cNvPr id="4" name="Date Placeholder 3"/>
-          <p:cNvSpPr>
-            <a:spLocks noGrp="1"/>
-          </p:cNvSpPr>
-          <p:nvPr>
-            <p:ph type="dt" sz="half" idx="10"/>
-          </p:nvPr>
-        </p:nvSpPr>
-        <p:spPr/>
-        <p:txBody>
-          <a:bodyPr/>
-          <a:lstStyle/>
-          <a:p>
-            <a:fld id="{74F93749-3CD2-4A95-98ED-FE9E109683BE}" type="datetime4">
-              <a:rPr lang="en-US" smtClean="0"/>
-              <a:t>June 6, 2019</a:t>
-            </a:fld>
-            <a:endParaRPr lang="en-US" dirty="0"/>
-          </a:p>
-        </p:txBody>
-      </p:sp>
-      <p:sp>
-        <p:nvSpPr>
-          <p:cNvPr id="5" name="Footer Placeholder 4"/>
-          <p:cNvSpPr>
-            <a:spLocks noGrp="1"/>
-          </p:cNvSpPr>
-          <p:nvPr>
-            <p:ph type="ftr" sz="quarter" idx="11"/>
-          </p:nvPr>
-        </p:nvSpPr>
-        <p:spPr/>
-        <p:txBody>
-          <a:bodyPr/>
-          <a:lstStyle/>
-          <a:p>
-            <a:r>
-              <a:rPr lang="en-US"/>
-              <a:t>Digital Scholarship Services </a:t>
-            </a:r>
-            <a:r>
-              <a:rPr lang="en-US">
-                <a:solidFill>
-                  <a:schemeClr val="accent1">
-                    <a:lumMod val="50000"/>
-                  </a:schemeClr>
-                </a:solidFill>
-              </a:rPr>
-              <a:t>| Email</a:t>
-            </a:r>
-            <a:r>
-              <a:rPr lang="en-US"/>
-              <a:t> cf24@rice.edu </a:t>
-            </a:r>
-            <a:r>
-              <a:rPr lang="en-US">
-                <a:solidFill>
-                  <a:schemeClr val="accent1">
-                    <a:lumMod val="50000"/>
-                  </a:schemeClr>
-                </a:solidFill>
-              </a:rPr>
-              <a:t>|</a:t>
-            </a:r>
-            <a:r>
-              <a:rPr lang="en-US"/>
-              <a:t> library.rice.edu/dss</a:t>
-            </a:r>
-            <a:endParaRPr lang="en-US" dirty="0"/>
-          </a:p>
-        </p:txBody>
-      </p:sp>
-      <p:sp>
-        <p:nvSpPr>
-          <p:cNvPr id="6" name="Slide Number Placeholder 5"/>
-          <p:cNvSpPr>
-            <a:spLocks noGrp="1"/>
-          </p:cNvSpPr>
-          <p:nvPr>
-            <p:ph type="sldNum" sz="quarter" idx="12"/>
-          </p:nvPr>
-        </p:nvSpPr>
-        <p:spPr/>
-        <p:txBody>
-          <a:bodyPr/>
-          <a:lstStyle/>
-          <a:p>
-            <a:fld id="{D57F1E4F-1CFF-5643-939E-02111984F565}" type="slidenum">
-              <a:rPr lang="en-US" smtClean="0"/>
-              <a:t>29</a:t>
-            </a:fld>
-            <a:endParaRPr lang="en-US" dirty="0"/>
-          </a:p>
-        </p:txBody>
-      </p:sp>
-    </p:spTree>
-    <p:extLst>
-      <p:ext uri="{BB962C8B-B14F-4D97-AF65-F5344CB8AC3E}">
-        <p14:creationId xmlns:p14="http://schemas.microsoft.com/office/powerpoint/2010/main" val="1458772907"/>
-      </p:ext>
-    </p:extLst>
-  </p:cSld>
-  <p:clrMapOvr>
-    <a:masterClrMapping/>
-  </p:clrMapOvr>
-</p:sld>
-</file>
-
 <file path=ppt/slides/slide3.xml><?xml version="1.0" encoding="utf-8"?>
 <p:sld xmlns:a="http://schemas.openxmlformats.org/drawingml/2006/main" xmlns:r="http://schemas.openxmlformats.org/officeDocument/2006/relationships" xmlns:p="http://schemas.openxmlformats.org/presentationml/2006/main">
   <p:cSld>
@@ -8859,7 +8958,7 @@
           <a:p>
             <a:fld id="{49C53E21-08B0-4FDE-BC40-11E60AED3BA0}" type="datetime4">
               <a:rPr lang="en-US" smtClean="0"/>
-              <a:t>June 6, 2019</a:t>
+              <a:t>June 12, 2019</a:t>
             </a:fld>
             <a:endParaRPr lang="en-US" dirty="0"/>
           </a:p>
@@ -9016,7 +9115,7 @@
           <a:p>
             <a:r>
               <a:rPr lang="en-US" dirty="0"/>
-              <a:t>GOING BACK IN TIME</a:t>
+              <a:t>UPLOADING OUR CHANGES</a:t>
             </a:r>
           </a:p>
         </p:txBody>
@@ -9034,7 +9133,7 @@
         <p:spPr>
           <a:xfrm>
             <a:off x="838200" y="1825625"/>
-            <a:ext cx="5262923" cy="4351338"/>
+            <a:ext cx="5063138" cy="4351338"/>
           </a:xfrm>
         </p:spPr>
         <p:txBody>
@@ -9043,49 +9142,24 @@
           <a:p>
             <a:r>
               <a:rPr lang="en-US" dirty="0"/>
-              <a:t>What if we </a:t>
-            </a:r>
-            <a:r>
-              <a:rPr lang="en-US" dirty="0" smtClean="0"/>
-              <a:t>accidentally made </a:t>
-            </a:r>
-            <a:r>
-              <a:rPr lang="en-US" dirty="0"/>
-              <a:t>a change </a:t>
-            </a:r>
-            <a:r>
-              <a:rPr lang="en-US" dirty="0" smtClean="0"/>
-              <a:t>that deleted </a:t>
-            </a:r>
-            <a:r>
-              <a:rPr lang="en-US" dirty="0"/>
-              <a:t>something we really needed?</a:t>
-            </a:r>
-          </a:p>
-          <a:p>
-            <a:r>
-              <a:rPr lang="en-US" dirty="0"/>
-              <a:t>Solution: </a:t>
-            </a:r>
-            <a:r>
-              <a:rPr lang="en-US" dirty="0" smtClean="0"/>
-              <a:t>Revert </a:t>
-            </a:r>
-            <a:r>
-              <a:rPr lang="en-US" dirty="0"/>
-              <a:t>to a previous commit</a:t>
-            </a:r>
-            <a:r>
-              <a:rPr lang="en-US" dirty="0" smtClean="0"/>
-              <a:t>!</a:t>
-            </a:r>
-          </a:p>
-          <a:p>
-            <a:r>
-              <a:rPr lang="en-US" dirty="0" smtClean="0"/>
-              <a:t>Note this doesn’t delete the changes after the revert</a:t>
-            </a:r>
-            <a:endParaRPr lang="en-US" dirty="0"/>
+              <a:t>Once we have a commit, we can send it to GitHub</a:t>
+            </a:r>
+          </a:p>
+          <a:p>
+            <a:r>
+              <a:rPr lang="en-US" dirty="0"/>
+              <a:t>This is called a </a:t>
+            </a:r>
+            <a:r>
+              <a:rPr lang="en-US" b="1" dirty="0"/>
+              <a:t>push</a:t>
+            </a:r>
+          </a:p>
+          <a:p>
+            <a:r>
+              <a:rPr lang="en-US" dirty="0"/>
+              <a:t>Note: Changes are not sent to the server by default!</a:t>
+            </a:r>
           </a:p>
         </p:txBody>
       </p:sp>
@@ -9106,7 +9180,7 @@
           <a:p>
             <a:fld id="{74F93749-3CD2-4A95-98ED-FE9E109683BE}" type="datetime4">
               <a:rPr lang="en-US" smtClean="0"/>
-              <a:t>June 6, 2019</a:t>
+              <a:t>June 12, 2019</a:t>
             </a:fld>
             <a:endParaRPr lang="en-US" dirty="0"/>
           </a:p>
@@ -9181,6 +9255,435 @@
             <a:fld id="{D57F1E4F-1CFF-5643-939E-02111984F565}" type="slidenum">
               <a:rPr lang="en-US" smtClean="0"/>
               <a:t>30</a:t>
+            </a:fld>
+            <a:endParaRPr lang="en-US" dirty="0"/>
+          </a:p>
+        </p:txBody>
+      </p:sp>
+      <p:pic>
+        <p:nvPicPr>
+          <p:cNvPr id="8194" name="Picture 2" descr="push.PNG"/>
+          <p:cNvPicPr>
+            <a:picLocks noChangeAspect="1" noChangeArrowheads="1"/>
+          </p:cNvPicPr>
+          <p:nvPr/>
+        </p:nvPicPr>
+        <p:blipFill>
+          <a:blip r:embed="rId2">
+            <a:extLst>
+              <a:ext uri="{28A0092B-C50C-407E-A947-70E740481C1C}">
+                <a14:useLocalDpi xmlns:a14="http://schemas.microsoft.com/office/drawing/2010/main" val="0"/>
+              </a:ext>
+            </a:extLst>
+          </a:blip>
+          <a:srcRect/>
+          <a:stretch>
+            <a:fillRect/>
+          </a:stretch>
+        </p:blipFill>
+        <p:spPr bwMode="auto">
+          <a:xfrm>
+            <a:off x="6096000" y="1825625"/>
+            <a:ext cx="5618209" cy="4111022"/>
+          </a:xfrm>
+          <a:prstGeom prst="rect">
+            <a:avLst/>
+          </a:prstGeom>
+          <a:noFill/>
+          <a:extLst>
+            <a:ext uri="{909E8E84-426E-40DD-AFC4-6F175D3DCCD1}">
+              <a14:hiddenFill xmlns:a14="http://schemas.microsoft.com/office/drawing/2010/main">
+                <a:solidFill>
+                  <a:srgbClr val="FFFFFF"/>
+                </a:solidFill>
+              </a14:hiddenFill>
+            </a:ext>
+          </a:extLst>
+        </p:spPr>
+      </p:pic>
+    </p:spTree>
+    <p:extLst>
+      <p:ext uri="{BB962C8B-B14F-4D97-AF65-F5344CB8AC3E}">
+        <p14:creationId xmlns:p14="http://schemas.microsoft.com/office/powerpoint/2010/main" val="366690583"/>
+      </p:ext>
+    </p:extLst>
+  </p:cSld>
+  <p:clrMapOvr>
+    <a:masterClrMapping/>
+  </p:clrMapOvr>
+</p:sld>
+</file>
+
+<file path=ppt/slides/slide31.xml><?xml version="1.0" encoding="utf-8"?>
+<p:sld xmlns:a="http://schemas.openxmlformats.org/drawingml/2006/main" xmlns:r="http://schemas.openxmlformats.org/officeDocument/2006/relationships" xmlns:p="http://schemas.openxmlformats.org/presentationml/2006/main">
+  <p:cSld>
+    <p:spTree>
+      <p:nvGrpSpPr>
+        <p:cNvPr id="1" name=""/>
+        <p:cNvGrpSpPr/>
+        <p:nvPr/>
+      </p:nvGrpSpPr>
+      <p:grpSpPr>
+        <a:xfrm>
+          <a:off x="0" y="0"/>
+          <a:ext cx="0" cy="0"/>
+          <a:chOff x="0" y="0"/>
+          <a:chExt cx="0" cy="0"/>
+        </a:xfrm>
+      </p:grpSpPr>
+      <p:sp>
+        <p:nvSpPr>
+          <p:cNvPr id="2" name="Title 1"/>
+          <p:cNvSpPr>
+            <a:spLocks noGrp="1"/>
+          </p:cNvSpPr>
+          <p:nvPr>
+            <p:ph type="title"/>
+          </p:nvPr>
+        </p:nvSpPr>
+        <p:spPr/>
+        <p:txBody>
+          <a:bodyPr/>
+          <a:lstStyle/>
+          <a:p>
+            <a:r>
+              <a:rPr lang="en-US" dirty="0"/>
+              <a:t>UPLOADING OUR CHANGES</a:t>
+            </a:r>
+          </a:p>
+        </p:txBody>
+      </p:sp>
+      <p:sp>
+        <p:nvSpPr>
+          <p:cNvPr id="3" name="Content Placeholder 2"/>
+          <p:cNvSpPr>
+            <a:spLocks noGrp="1"/>
+          </p:cNvSpPr>
+          <p:nvPr>
+            <p:ph idx="1"/>
+          </p:nvPr>
+        </p:nvSpPr>
+        <p:spPr/>
+        <p:txBody>
+          <a:bodyPr/>
+          <a:lstStyle/>
+          <a:p>
+            <a:r>
+              <a:rPr lang="en-US" dirty="0"/>
+              <a:t>From the repository cloned earlier, upload a file with any message you like!</a:t>
+            </a:r>
+          </a:p>
+        </p:txBody>
+      </p:sp>
+      <p:sp>
+        <p:nvSpPr>
+          <p:cNvPr id="4" name="Date Placeholder 3"/>
+          <p:cNvSpPr>
+            <a:spLocks noGrp="1"/>
+          </p:cNvSpPr>
+          <p:nvPr>
+            <p:ph type="dt" sz="half" idx="10"/>
+          </p:nvPr>
+        </p:nvSpPr>
+        <p:spPr/>
+        <p:txBody>
+          <a:bodyPr/>
+          <a:lstStyle/>
+          <a:p>
+            <a:fld id="{74F93749-3CD2-4A95-98ED-FE9E109683BE}" type="datetime4">
+              <a:rPr lang="en-US" smtClean="0"/>
+              <a:t>June 12, 2019</a:t>
+            </a:fld>
+            <a:endParaRPr lang="en-US" dirty="0"/>
+          </a:p>
+        </p:txBody>
+      </p:sp>
+      <p:sp>
+        <p:nvSpPr>
+          <p:cNvPr id="5" name="Footer Placeholder 4"/>
+          <p:cNvSpPr>
+            <a:spLocks noGrp="1"/>
+          </p:cNvSpPr>
+          <p:nvPr>
+            <p:ph type="ftr" sz="quarter" idx="11"/>
+          </p:nvPr>
+        </p:nvSpPr>
+        <p:spPr/>
+        <p:txBody>
+          <a:bodyPr/>
+          <a:lstStyle/>
+          <a:p>
+            <a:r>
+              <a:rPr lang="en-US"/>
+              <a:t>Digital Scholarship Services </a:t>
+            </a:r>
+            <a:r>
+              <a:rPr lang="en-US">
+                <a:solidFill>
+                  <a:schemeClr val="accent1">
+                    <a:lumMod val="50000"/>
+                  </a:schemeClr>
+                </a:solidFill>
+              </a:rPr>
+              <a:t>| Email</a:t>
+            </a:r>
+            <a:r>
+              <a:rPr lang="en-US"/>
+              <a:t> cf24@rice.edu </a:t>
+            </a:r>
+            <a:r>
+              <a:rPr lang="en-US">
+                <a:solidFill>
+                  <a:schemeClr val="accent1">
+                    <a:lumMod val="50000"/>
+                  </a:schemeClr>
+                </a:solidFill>
+              </a:rPr>
+              <a:t>|</a:t>
+            </a:r>
+            <a:r>
+              <a:rPr lang="en-US"/>
+              <a:t> library.rice.edu/dss</a:t>
+            </a:r>
+            <a:endParaRPr lang="en-US" dirty="0"/>
+          </a:p>
+        </p:txBody>
+      </p:sp>
+      <p:sp>
+        <p:nvSpPr>
+          <p:cNvPr id="6" name="Slide Number Placeholder 5"/>
+          <p:cNvSpPr>
+            <a:spLocks noGrp="1"/>
+          </p:cNvSpPr>
+          <p:nvPr>
+            <p:ph type="sldNum" sz="quarter" idx="12"/>
+          </p:nvPr>
+        </p:nvSpPr>
+        <p:spPr/>
+        <p:txBody>
+          <a:bodyPr/>
+          <a:lstStyle/>
+          <a:p>
+            <a:fld id="{D57F1E4F-1CFF-5643-939E-02111984F565}" type="slidenum">
+              <a:rPr lang="en-US" smtClean="0"/>
+              <a:t>31</a:t>
+            </a:fld>
+            <a:endParaRPr lang="en-US" dirty="0"/>
+          </a:p>
+        </p:txBody>
+      </p:sp>
+    </p:spTree>
+    <p:extLst>
+      <p:ext uri="{BB962C8B-B14F-4D97-AF65-F5344CB8AC3E}">
+        <p14:creationId xmlns:p14="http://schemas.microsoft.com/office/powerpoint/2010/main" val="1458772907"/>
+      </p:ext>
+    </p:extLst>
+  </p:cSld>
+  <p:clrMapOvr>
+    <a:masterClrMapping/>
+  </p:clrMapOvr>
+</p:sld>
+</file>
+
+<file path=ppt/slides/slide32.xml><?xml version="1.0" encoding="utf-8"?>
+<p:sld xmlns:a="http://schemas.openxmlformats.org/drawingml/2006/main" xmlns:r="http://schemas.openxmlformats.org/officeDocument/2006/relationships" xmlns:p="http://schemas.openxmlformats.org/presentationml/2006/main">
+  <p:cSld>
+    <p:spTree>
+      <p:nvGrpSpPr>
+        <p:cNvPr id="1" name=""/>
+        <p:cNvGrpSpPr/>
+        <p:nvPr/>
+      </p:nvGrpSpPr>
+      <p:grpSpPr>
+        <a:xfrm>
+          <a:off x="0" y="0"/>
+          <a:ext cx="0" cy="0"/>
+          <a:chOff x="0" y="0"/>
+          <a:chExt cx="0" cy="0"/>
+        </a:xfrm>
+      </p:grpSpPr>
+      <p:sp>
+        <p:nvSpPr>
+          <p:cNvPr id="2" name="Title 1"/>
+          <p:cNvSpPr>
+            <a:spLocks noGrp="1"/>
+          </p:cNvSpPr>
+          <p:nvPr>
+            <p:ph type="title"/>
+          </p:nvPr>
+        </p:nvSpPr>
+        <p:spPr/>
+        <p:txBody>
+          <a:bodyPr/>
+          <a:lstStyle/>
+          <a:p>
+            <a:r>
+              <a:rPr lang="en-US" dirty="0"/>
+              <a:t>GOING BACK IN TIME</a:t>
+            </a:r>
+          </a:p>
+        </p:txBody>
+      </p:sp>
+      <p:sp>
+        <p:nvSpPr>
+          <p:cNvPr id="3" name="Content Placeholder 2"/>
+          <p:cNvSpPr>
+            <a:spLocks noGrp="1"/>
+          </p:cNvSpPr>
+          <p:nvPr>
+            <p:ph idx="1"/>
+          </p:nvPr>
+        </p:nvSpPr>
+        <p:spPr>
+          <a:xfrm>
+            <a:off x="838200" y="1825625"/>
+            <a:ext cx="5262923" cy="4351338"/>
+          </a:xfrm>
+        </p:spPr>
+        <p:txBody>
+          <a:bodyPr/>
+          <a:lstStyle/>
+          <a:p>
+            <a:r>
+              <a:rPr lang="en-US" dirty="0"/>
+              <a:t>What if we </a:t>
+            </a:r>
+            <a:r>
+              <a:rPr lang="en-US" dirty="0" smtClean="0"/>
+              <a:t>accidentally made </a:t>
+            </a:r>
+            <a:r>
+              <a:rPr lang="en-US" dirty="0"/>
+              <a:t>a change </a:t>
+            </a:r>
+            <a:r>
+              <a:rPr lang="en-US" dirty="0" smtClean="0"/>
+              <a:t>that deleted </a:t>
+            </a:r>
+            <a:r>
+              <a:rPr lang="en-US" dirty="0"/>
+              <a:t>something we really needed?</a:t>
+            </a:r>
+          </a:p>
+          <a:p>
+            <a:r>
+              <a:rPr lang="en-US" dirty="0"/>
+              <a:t>Solution: </a:t>
+            </a:r>
+            <a:r>
+              <a:rPr lang="en-US" dirty="0" smtClean="0"/>
+              <a:t>Revert </a:t>
+            </a:r>
+            <a:r>
+              <a:rPr lang="en-US" dirty="0"/>
+              <a:t>to a previous commit</a:t>
+            </a:r>
+            <a:r>
+              <a:rPr lang="en-US" dirty="0" smtClean="0"/>
+              <a:t>!</a:t>
+            </a:r>
+          </a:p>
+          <a:p>
+            <a:r>
+              <a:rPr lang="en-US" dirty="0" smtClean="0"/>
+              <a:t>Note this doesn’t delete the changes after the revert</a:t>
+            </a:r>
+            <a:endParaRPr lang="en-US" dirty="0"/>
+          </a:p>
+        </p:txBody>
+      </p:sp>
+      <p:sp>
+        <p:nvSpPr>
+          <p:cNvPr id="4" name="Date Placeholder 3"/>
+          <p:cNvSpPr>
+            <a:spLocks noGrp="1"/>
+          </p:cNvSpPr>
+          <p:nvPr>
+            <p:ph type="dt" sz="half" idx="10"/>
+          </p:nvPr>
+        </p:nvSpPr>
+        <p:spPr/>
+        <p:txBody>
+          <a:bodyPr/>
+          <a:lstStyle/>
+          <a:p>
+            <a:fld id="{74F93749-3CD2-4A95-98ED-FE9E109683BE}" type="datetime4">
+              <a:rPr lang="en-US" smtClean="0"/>
+              <a:t>June 12, 2019</a:t>
+            </a:fld>
+            <a:endParaRPr lang="en-US" dirty="0"/>
+          </a:p>
+        </p:txBody>
+      </p:sp>
+      <p:sp>
+        <p:nvSpPr>
+          <p:cNvPr id="5" name="Footer Placeholder 4"/>
+          <p:cNvSpPr>
+            <a:spLocks noGrp="1"/>
+          </p:cNvSpPr>
+          <p:nvPr>
+            <p:ph type="ftr" sz="quarter" idx="11"/>
+          </p:nvPr>
+        </p:nvSpPr>
+        <p:spPr/>
+        <p:txBody>
+          <a:bodyPr/>
+          <a:lstStyle/>
+          <a:p>
+            <a:r>
+              <a:rPr lang="en-US"/>
+              <a:t>Digital Scholarship Services </a:t>
+            </a:r>
+            <a:r>
+              <a:rPr lang="en-US">
+                <a:solidFill>
+                  <a:schemeClr val="accent1">
+                    <a:lumMod val="50000"/>
+                  </a:schemeClr>
+                </a:solidFill>
+              </a:rPr>
+              <a:t>| Email</a:t>
+            </a:r>
+            <a:r>
+              <a:rPr lang="en-US"/>
+              <a:t> cf24@rice.edu </a:t>
+            </a:r>
+            <a:r>
+              <a:rPr lang="en-US">
+                <a:solidFill>
+                  <a:schemeClr val="accent1">
+                    <a:lumMod val="50000"/>
+                  </a:schemeClr>
+                </a:solidFill>
+              </a:rPr>
+              <a:t>|</a:t>
+            </a:r>
+            <a:r>
+              <a:rPr lang="en-US"/>
+              <a:t> library.rice.edu/dss</a:t>
+            </a:r>
+            <a:endParaRPr lang="en-US" dirty="0"/>
+          </a:p>
+        </p:txBody>
+      </p:sp>
+      <p:sp>
+        <p:nvSpPr>
+          <p:cNvPr id="6" name="Slide Number Placeholder 5"/>
+          <p:cNvSpPr>
+            <a:spLocks noGrp="1"/>
+          </p:cNvSpPr>
+          <p:nvPr>
+            <p:ph type="sldNum" sz="quarter" idx="12"/>
+          </p:nvPr>
+        </p:nvSpPr>
+        <p:spPr/>
+        <p:txBody>
+          <a:bodyPr/>
+          <a:lstStyle/>
+          <a:p>
+            <a:fld id="{D57F1E4F-1CFF-5643-939E-02111984F565}" type="slidenum">
+              <a:rPr lang="en-US" smtClean="0"/>
+              <a:t>32</a:t>
             </a:fld>
             <a:endParaRPr lang="en-US" dirty="0"/>
           </a:p>
@@ -9240,356 +9743,6 @@
 </p:sld>
 </file>
 
-<file path=ppt/slides/slide31.xml><?xml version="1.0" encoding="utf-8"?>
-<p:sld xmlns:a="http://schemas.openxmlformats.org/drawingml/2006/main" xmlns:r="http://schemas.openxmlformats.org/officeDocument/2006/relationships" xmlns:p="http://schemas.openxmlformats.org/presentationml/2006/main">
-  <p:cSld>
-    <p:spTree>
-      <p:nvGrpSpPr>
-        <p:cNvPr id="1" name=""/>
-        <p:cNvGrpSpPr/>
-        <p:nvPr/>
-      </p:nvGrpSpPr>
-      <p:grpSpPr>
-        <a:xfrm>
-          <a:off x="0" y="0"/>
-          <a:ext cx="0" cy="0"/>
-          <a:chOff x="0" y="0"/>
-          <a:chExt cx="0" cy="0"/>
-        </a:xfrm>
-      </p:grpSpPr>
-      <p:sp>
-        <p:nvSpPr>
-          <p:cNvPr id="2" name="Title 1"/>
-          <p:cNvSpPr>
-            <a:spLocks noGrp="1"/>
-          </p:cNvSpPr>
-          <p:nvPr>
-            <p:ph type="title"/>
-          </p:nvPr>
-        </p:nvSpPr>
-        <p:spPr/>
-        <p:txBody>
-          <a:bodyPr/>
-          <a:lstStyle/>
-          <a:p>
-            <a:r>
-              <a:rPr lang="en-US" dirty="0"/>
-              <a:t>GOING BACK IN TIME</a:t>
-            </a:r>
-          </a:p>
-        </p:txBody>
-      </p:sp>
-      <p:sp>
-        <p:nvSpPr>
-          <p:cNvPr id="3" name="Content Placeholder 2"/>
-          <p:cNvSpPr>
-            <a:spLocks noGrp="1"/>
-          </p:cNvSpPr>
-          <p:nvPr>
-            <p:ph idx="1"/>
-          </p:nvPr>
-        </p:nvSpPr>
-        <p:spPr>
-          <a:xfrm>
-            <a:off x="838200" y="1825625"/>
-            <a:ext cx="10891345" cy="4351338"/>
-          </a:xfrm>
-        </p:spPr>
-        <p:txBody>
-          <a:bodyPr/>
-          <a:lstStyle/>
-          <a:p>
-            <a:r>
-              <a:rPr lang="en-US" dirty="0" smtClean="0"/>
-              <a:t>Revert your message, then commit something different and push again!</a:t>
-            </a:r>
-            <a:endParaRPr lang="en-US" dirty="0"/>
-          </a:p>
-        </p:txBody>
-      </p:sp>
-      <p:sp>
-        <p:nvSpPr>
-          <p:cNvPr id="4" name="Date Placeholder 3"/>
-          <p:cNvSpPr>
-            <a:spLocks noGrp="1"/>
-          </p:cNvSpPr>
-          <p:nvPr>
-            <p:ph type="dt" sz="half" idx="10"/>
-          </p:nvPr>
-        </p:nvSpPr>
-        <p:spPr/>
-        <p:txBody>
-          <a:bodyPr/>
-          <a:lstStyle/>
-          <a:p>
-            <a:fld id="{74F93749-3CD2-4A95-98ED-FE9E109683BE}" type="datetime4">
-              <a:rPr lang="en-US" smtClean="0"/>
-              <a:t>June 6, 2019</a:t>
-            </a:fld>
-            <a:endParaRPr lang="en-US" dirty="0"/>
-          </a:p>
-        </p:txBody>
-      </p:sp>
-      <p:sp>
-        <p:nvSpPr>
-          <p:cNvPr id="5" name="Footer Placeholder 4"/>
-          <p:cNvSpPr>
-            <a:spLocks noGrp="1"/>
-          </p:cNvSpPr>
-          <p:nvPr>
-            <p:ph type="ftr" sz="quarter" idx="11"/>
-          </p:nvPr>
-        </p:nvSpPr>
-        <p:spPr/>
-        <p:txBody>
-          <a:bodyPr/>
-          <a:lstStyle/>
-          <a:p>
-            <a:r>
-              <a:rPr lang="en-US"/>
-              <a:t>Digital Scholarship Services </a:t>
-            </a:r>
-            <a:r>
-              <a:rPr lang="en-US">
-                <a:solidFill>
-                  <a:schemeClr val="accent1">
-                    <a:lumMod val="50000"/>
-                  </a:schemeClr>
-                </a:solidFill>
-              </a:rPr>
-              <a:t>| Email</a:t>
-            </a:r>
-            <a:r>
-              <a:rPr lang="en-US"/>
-              <a:t> cf24@rice.edu </a:t>
-            </a:r>
-            <a:r>
-              <a:rPr lang="en-US">
-                <a:solidFill>
-                  <a:schemeClr val="accent1">
-                    <a:lumMod val="50000"/>
-                  </a:schemeClr>
-                </a:solidFill>
-              </a:rPr>
-              <a:t>|</a:t>
-            </a:r>
-            <a:r>
-              <a:rPr lang="en-US"/>
-              <a:t> library.rice.edu/dss</a:t>
-            </a:r>
-            <a:endParaRPr lang="en-US" dirty="0"/>
-          </a:p>
-        </p:txBody>
-      </p:sp>
-      <p:sp>
-        <p:nvSpPr>
-          <p:cNvPr id="6" name="Slide Number Placeholder 5"/>
-          <p:cNvSpPr>
-            <a:spLocks noGrp="1"/>
-          </p:cNvSpPr>
-          <p:nvPr>
-            <p:ph type="sldNum" sz="quarter" idx="12"/>
-          </p:nvPr>
-        </p:nvSpPr>
-        <p:spPr/>
-        <p:txBody>
-          <a:bodyPr/>
-          <a:lstStyle/>
-          <a:p>
-            <a:fld id="{D57F1E4F-1CFF-5643-939E-02111984F565}" type="slidenum">
-              <a:rPr lang="en-US" smtClean="0"/>
-              <a:t>31</a:t>
-            </a:fld>
-            <a:endParaRPr lang="en-US" dirty="0"/>
-          </a:p>
-        </p:txBody>
-      </p:sp>
-    </p:spTree>
-    <p:extLst>
-      <p:ext uri="{BB962C8B-B14F-4D97-AF65-F5344CB8AC3E}">
-        <p14:creationId xmlns:p14="http://schemas.microsoft.com/office/powerpoint/2010/main" val="2894062311"/>
-      </p:ext>
-    </p:extLst>
-  </p:cSld>
-  <p:clrMapOvr>
-    <a:masterClrMapping/>
-  </p:clrMapOvr>
-</p:sld>
-</file>
-
-<file path=ppt/slides/slide32.xml><?xml version="1.0" encoding="utf-8"?>
-<p:sld xmlns:a="http://schemas.openxmlformats.org/drawingml/2006/main" xmlns:r="http://schemas.openxmlformats.org/officeDocument/2006/relationships" xmlns:p="http://schemas.openxmlformats.org/presentationml/2006/main">
-  <p:cSld>
-    <p:spTree>
-      <p:nvGrpSpPr>
-        <p:cNvPr id="1" name=""/>
-        <p:cNvGrpSpPr/>
-        <p:nvPr/>
-      </p:nvGrpSpPr>
-      <p:grpSpPr>
-        <a:xfrm>
-          <a:off x="0" y="0"/>
-          <a:ext cx="0" cy="0"/>
-          <a:chOff x="0" y="0"/>
-          <a:chExt cx="0" cy="0"/>
-        </a:xfrm>
-      </p:grpSpPr>
-      <p:sp>
-        <p:nvSpPr>
-          <p:cNvPr id="4" name="Title 3"/>
-          <p:cNvSpPr>
-            <a:spLocks noGrp="1"/>
-          </p:cNvSpPr>
-          <p:nvPr>
-            <p:ph type="title"/>
-          </p:nvPr>
-        </p:nvSpPr>
-        <p:spPr/>
-        <p:txBody>
-          <a:bodyPr/>
-          <a:lstStyle/>
-          <a:p>
-            <a:r>
-              <a:rPr lang="en-US" dirty="0">
-                <a:latin typeface="+mn-lt"/>
-              </a:rPr>
-              <a:t>BRANCHES &amp; MERGING</a:t>
-            </a:r>
-          </a:p>
-        </p:txBody>
-      </p:sp>
-      <p:sp>
-        <p:nvSpPr>
-          <p:cNvPr id="5" name="Text Placeholder 4"/>
-          <p:cNvSpPr>
-            <a:spLocks noGrp="1"/>
-          </p:cNvSpPr>
-          <p:nvPr>
-            <p:ph type="body" idx="1"/>
-          </p:nvPr>
-        </p:nvSpPr>
-        <p:spPr/>
-        <p:txBody>
-          <a:bodyPr/>
-          <a:lstStyle/>
-          <a:p>
-            <a:r>
-              <a:rPr lang="en-US" dirty="0"/>
-              <a:t>Creating, working on, combining, and switching branches</a:t>
-            </a:r>
-          </a:p>
-        </p:txBody>
-      </p:sp>
-      <p:sp>
-        <p:nvSpPr>
-          <p:cNvPr id="7" name="Date Placeholder 6"/>
-          <p:cNvSpPr>
-            <a:spLocks noGrp="1"/>
-          </p:cNvSpPr>
-          <p:nvPr>
-            <p:ph type="dt" sz="half" idx="10"/>
-          </p:nvPr>
-        </p:nvSpPr>
-        <p:spPr/>
-        <p:txBody>
-          <a:bodyPr/>
-          <a:lstStyle/>
-          <a:p>
-            <a:fld id="{058BBB48-E612-431F-A2D1-FE84E0649533}" type="datetime4">
-              <a:rPr lang="en-US" smtClean="0"/>
-              <a:t>June 6, 2019</a:t>
-            </a:fld>
-            <a:endParaRPr lang="en-US" dirty="0"/>
-          </a:p>
-        </p:txBody>
-      </p:sp>
-      <p:sp>
-        <p:nvSpPr>
-          <p:cNvPr id="8" name="Slide Number Placeholder 7"/>
-          <p:cNvSpPr>
-            <a:spLocks noGrp="1"/>
-          </p:cNvSpPr>
-          <p:nvPr>
-            <p:ph type="sldNum" sz="quarter" idx="12"/>
-          </p:nvPr>
-        </p:nvSpPr>
-        <p:spPr/>
-        <p:txBody>
-          <a:bodyPr/>
-          <a:lstStyle/>
-          <a:p>
-            <a:fld id="{D57F1E4F-1CFF-5643-939E-02111984F565}" type="slidenum">
-              <a:rPr lang="en-US" smtClean="0"/>
-              <a:t>32</a:t>
-            </a:fld>
-            <a:endParaRPr lang="en-US" dirty="0"/>
-          </a:p>
-        </p:txBody>
-      </p:sp>
-      <p:sp>
-        <p:nvSpPr>
-          <p:cNvPr id="2" name="Footer Placeholder 1"/>
-          <p:cNvSpPr>
-            <a:spLocks noGrp="1"/>
-          </p:cNvSpPr>
-          <p:nvPr>
-            <p:ph type="ftr" sz="quarter" idx="11"/>
-          </p:nvPr>
-        </p:nvSpPr>
-        <p:spPr/>
-        <p:txBody>
-          <a:bodyPr/>
-          <a:lstStyle/>
-          <a:p>
-            <a:r>
-              <a:rPr lang="en-US"/>
-              <a:t>Digital Scholarship Services </a:t>
-            </a:r>
-            <a:r>
-              <a:rPr lang="en-US">
-                <a:solidFill>
-                  <a:schemeClr val="accent1">
-                    <a:lumMod val="50000"/>
-                  </a:schemeClr>
-                </a:solidFill>
-              </a:rPr>
-              <a:t>| Email</a:t>
-            </a:r>
-            <a:r>
-              <a:rPr lang="en-US"/>
-              <a:t> cf24@rice.edu </a:t>
-            </a:r>
-            <a:r>
-              <a:rPr lang="en-US">
-                <a:solidFill>
-                  <a:schemeClr val="accent1">
-                    <a:lumMod val="50000"/>
-                  </a:schemeClr>
-                </a:solidFill>
-              </a:rPr>
-              <a:t>|</a:t>
-            </a:r>
-            <a:r>
-              <a:rPr lang="en-US"/>
-              <a:t> library.rice.edu/dss</a:t>
-            </a:r>
-            <a:endParaRPr lang="en-US" dirty="0"/>
-          </a:p>
-        </p:txBody>
-      </p:sp>
-    </p:spTree>
-    <p:extLst>
-      <p:ext uri="{BB962C8B-B14F-4D97-AF65-F5344CB8AC3E}">
-        <p14:creationId xmlns:p14="http://schemas.microsoft.com/office/powerpoint/2010/main" val="2804592253"/>
-      </p:ext>
-    </p:extLst>
-  </p:cSld>
-  <p:clrMapOvr>
-    <a:masterClrMapping/>
-  </p:clrMapOvr>
-</p:sld>
-</file>
-
 <file path=ppt/slides/slide33.xml><?xml version="1.0" encoding="utf-8"?>
 <p:sld xmlns:a="http://schemas.openxmlformats.org/drawingml/2006/main" xmlns:r="http://schemas.openxmlformats.org/officeDocument/2006/relationships" xmlns:p="http://schemas.openxmlformats.org/presentationml/2006/main">
   <p:cSld>
@@ -9609,7 +9762,7 @@
       </p:grpSpPr>
       <p:sp>
         <p:nvSpPr>
-          <p:cNvPr id="7" name="Title 6"/>
+          <p:cNvPr id="2" name="Title 1"/>
           <p:cNvSpPr>
             <a:spLocks noGrp="1"/>
           </p:cNvSpPr>
@@ -9624,14 +9777,14 @@
           <a:p>
             <a:r>
               <a:rPr lang="en-US" dirty="0"/>
-              <a:t>BRANCHES</a:t>
-            </a:r>
-          </a:p>
-        </p:txBody>
-      </p:sp>
-      <p:sp>
-        <p:nvSpPr>
-          <p:cNvPr id="8" name="Content Placeholder 7"/>
+              <a:t>GOING BACK IN TIME</a:t>
+            </a:r>
+          </a:p>
+        </p:txBody>
+      </p:sp>
+      <p:sp>
+        <p:nvSpPr>
+          <p:cNvPr id="3" name="Content Placeholder 2"/>
           <p:cNvSpPr>
             <a:spLocks noGrp="1"/>
           </p:cNvSpPr>
@@ -9642,7 +9795,7 @@
         <p:spPr>
           <a:xfrm>
             <a:off x="838200" y="1825625"/>
-            <a:ext cx="4947745" cy="4351338"/>
+            <a:ext cx="10891345" cy="4351338"/>
           </a:xfrm>
         </p:spPr>
         <p:txBody>
@@ -9650,34 +9803,10 @@
           <a:lstStyle/>
           <a:p>
             <a:r>
-              <a:rPr lang="en-US" dirty="0"/>
-              <a:t>If you’re working on different features or as part of a larger team</a:t>
-            </a:r>
-          </a:p>
-          <a:p>
-            <a:r>
-              <a:rPr lang="en-US" dirty="0"/>
-              <a:t>Divergent history</a:t>
-            </a:r>
-          </a:p>
-          <a:p>
-            <a:r>
-              <a:rPr lang="en-US" dirty="0"/>
-              <a:t>Independent files</a:t>
-            </a:r>
-          </a:p>
-          <a:p>
-            <a:pPr lvl="1"/>
-            <a:r>
-              <a:rPr lang="en-US" dirty="0"/>
-              <a:t>Avoids unintended consequences!</a:t>
-            </a:r>
-          </a:p>
-          <a:p>
-            <a:r>
-              <a:rPr lang="en-US" dirty="0"/>
-              <a:t>Easy integration</a:t>
-            </a:r>
+              <a:rPr lang="en-US" dirty="0" smtClean="0"/>
+              <a:t>Revert your message, then commit something different and push again!</a:t>
+            </a:r>
+            <a:endParaRPr lang="en-US" dirty="0"/>
           </a:p>
         </p:txBody>
       </p:sp>
@@ -9696,9 +9825,9 @@
           <a:bodyPr/>
           <a:lstStyle/>
           <a:p>
-            <a:fld id="{930E186A-0FBF-4DA6-A71A-C325C944F843}" type="datetime4">
+            <a:fld id="{74F93749-3CD2-4A95-98ED-FE9E109683BE}" type="datetime4">
               <a:rPr lang="en-US" smtClean="0"/>
-              <a:t>June 6, 2019</a:t>
+              <a:t>June 12, 2019</a:t>
             </a:fld>
             <a:endParaRPr lang="en-US" dirty="0"/>
           </a:p>
@@ -9773,6 +9902,380 @@
             <a:fld id="{D57F1E4F-1CFF-5643-939E-02111984F565}" type="slidenum">
               <a:rPr lang="en-US" smtClean="0"/>
               <a:t>33</a:t>
+            </a:fld>
+            <a:endParaRPr lang="en-US" dirty="0"/>
+          </a:p>
+        </p:txBody>
+      </p:sp>
+    </p:spTree>
+    <p:extLst>
+      <p:ext uri="{BB962C8B-B14F-4D97-AF65-F5344CB8AC3E}">
+        <p14:creationId xmlns:p14="http://schemas.microsoft.com/office/powerpoint/2010/main" val="2894062311"/>
+      </p:ext>
+    </p:extLst>
+  </p:cSld>
+  <p:clrMapOvr>
+    <a:masterClrMapping/>
+  </p:clrMapOvr>
+</p:sld>
+</file>
+
+<file path=ppt/slides/slide34.xml><?xml version="1.0" encoding="utf-8"?>
+<p:sld xmlns:a="http://schemas.openxmlformats.org/drawingml/2006/main" xmlns:r="http://schemas.openxmlformats.org/officeDocument/2006/relationships" xmlns:p="http://schemas.openxmlformats.org/presentationml/2006/main">
+  <p:cSld>
+    <p:spTree>
+      <p:nvGrpSpPr>
+        <p:cNvPr id="1" name=""/>
+        <p:cNvGrpSpPr/>
+        <p:nvPr/>
+      </p:nvGrpSpPr>
+      <p:grpSpPr>
+        <a:xfrm>
+          <a:off x="0" y="0"/>
+          <a:ext cx="0" cy="0"/>
+          <a:chOff x="0" y="0"/>
+          <a:chExt cx="0" cy="0"/>
+        </a:xfrm>
+      </p:grpSpPr>
+      <p:sp>
+        <p:nvSpPr>
+          <p:cNvPr id="4" name="Title 3"/>
+          <p:cNvSpPr>
+            <a:spLocks noGrp="1"/>
+          </p:cNvSpPr>
+          <p:nvPr>
+            <p:ph type="title"/>
+          </p:nvPr>
+        </p:nvSpPr>
+        <p:spPr/>
+        <p:txBody>
+          <a:bodyPr/>
+          <a:lstStyle/>
+          <a:p>
+            <a:r>
+              <a:rPr lang="en-US" dirty="0">
+                <a:latin typeface="+mn-lt"/>
+              </a:rPr>
+              <a:t>BRANCHES &amp; MERGING</a:t>
+            </a:r>
+          </a:p>
+        </p:txBody>
+      </p:sp>
+      <p:sp>
+        <p:nvSpPr>
+          <p:cNvPr id="5" name="Text Placeholder 4"/>
+          <p:cNvSpPr>
+            <a:spLocks noGrp="1"/>
+          </p:cNvSpPr>
+          <p:nvPr>
+            <p:ph type="body" idx="1"/>
+          </p:nvPr>
+        </p:nvSpPr>
+        <p:spPr/>
+        <p:txBody>
+          <a:bodyPr/>
+          <a:lstStyle/>
+          <a:p>
+            <a:r>
+              <a:rPr lang="en-US" dirty="0"/>
+              <a:t>Creating, working on, combining, and switching branches</a:t>
+            </a:r>
+          </a:p>
+        </p:txBody>
+      </p:sp>
+      <p:sp>
+        <p:nvSpPr>
+          <p:cNvPr id="7" name="Date Placeholder 6"/>
+          <p:cNvSpPr>
+            <a:spLocks noGrp="1"/>
+          </p:cNvSpPr>
+          <p:nvPr>
+            <p:ph type="dt" sz="half" idx="10"/>
+          </p:nvPr>
+        </p:nvSpPr>
+        <p:spPr/>
+        <p:txBody>
+          <a:bodyPr/>
+          <a:lstStyle/>
+          <a:p>
+            <a:fld id="{058BBB48-E612-431F-A2D1-FE84E0649533}" type="datetime4">
+              <a:rPr lang="en-US" smtClean="0"/>
+              <a:t>June 12, 2019</a:t>
+            </a:fld>
+            <a:endParaRPr lang="en-US" dirty="0"/>
+          </a:p>
+        </p:txBody>
+      </p:sp>
+      <p:sp>
+        <p:nvSpPr>
+          <p:cNvPr id="8" name="Slide Number Placeholder 7"/>
+          <p:cNvSpPr>
+            <a:spLocks noGrp="1"/>
+          </p:cNvSpPr>
+          <p:nvPr>
+            <p:ph type="sldNum" sz="quarter" idx="12"/>
+          </p:nvPr>
+        </p:nvSpPr>
+        <p:spPr/>
+        <p:txBody>
+          <a:bodyPr/>
+          <a:lstStyle/>
+          <a:p>
+            <a:fld id="{D57F1E4F-1CFF-5643-939E-02111984F565}" type="slidenum">
+              <a:rPr lang="en-US" smtClean="0"/>
+              <a:t>34</a:t>
+            </a:fld>
+            <a:endParaRPr lang="en-US" dirty="0"/>
+          </a:p>
+        </p:txBody>
+      </p:sp>
+      <p:sp>
+        <p:nvSpPr>
+          <p:cNvPr id="2" name="Footer Placeholder 1"/>
+          <p:cNvSpPr>
+            <a:spLocks noGrp="1"/>
+          </p:cNvSpPr>
+          <p:nvPr>
+            <p:ph type="ftr" sz="quarter" idx="11"/>
+          </p:nvPr>
+        </p:nvSpPr>
+        <p:spPr/>
+        <p:txBody>
+          <a:bodyPr/>
+          <a:lstStyle/>
+          <a:p>
+            <a:r>
+              <a:rPr lang="en-US"/>
+              <a:t>Digital Scholarship Services </a:t>
+            </a:r>
+            <a:r>
+              <a:rPr lang="en-US">
+                <a:solidFill>
+                  <a:schemeClr val="accent1">
+                    <a:lumMod val="50000"/>
+                  </a:schemeClr>
+                </a:solidFill>
+              </a:rPr>
+              <a:t>| Email</a:t>
+            </a:r>
+            <a:r>
+              <a:rPr lang="en-US"/>
+              <a:t> cf24@rice.edu </a:t>
+            </a:r>
+            <a:r>
+              <a:rPr lang="en-US">
+                <a:solidFill>
+                  <a:schemeClr val="accent1">
+                    <a:lumMod val="50000"/>
+                  </a:schemeClr>
+                </a:solidFill>
+              </a:rPr>
+              <a:t>|</a:t>
+            </a:r>
+            <a:r>
+              <a:rPr lang="en-US"/>
+              <a:t> library.rice.edu/dss</a:t>
+            </a:r>
+            <a:endParaRPr lang="en-US" dirty="0"/>
+          </a:p>
+        </p:txBody>
+      </p:sp>
+    </p:spTree>
+    <p:extLst>
+      <p:ext uri="{BB962C8B-B14F-4D97-AF65-F5344CB8AC3E}">
+        <p14:creationId xmlns:p14="http://schemas.microsoft.com/office/powerpoint/2010/main" val="2804592253"/>
+      </p:ext>
+    </p:extLst>
+  </p:cSld>
+  <p:clrMapOvr>
+    <a:masterClrMapping/>
+  </p:clrMapOvr>
+</p:sld>
+</file>
+
+<file path=ppt/slides/slide35.xml><?xml version="1.0" encoding="utf-8"?>
+<p:sld xmlns:a="http://schemas.openxmlformats.org/drawingml/2006/main" xmlns:r="http://schemas.openxmlformats.org/officeDocument/2006/relationships" xmlns:p="http://schemas.openxmlformats.org/presentationml/2006/main">
+  <p:cSld>
+    <p:spTree>
+      <p:nvGrpSpPr>
+        <p:cNvPr id="1" name=""/>
+        <p:cNvGrpSpPr/>
+        <p:nvPr/>
+      </p:nvGrpSpPr>
+      <p:grpSpPr>
+        <a:xfrm>
+          <a:off x="0" y="0"/>
+          <a:ext cx="0" cy="0"/>
+          <a:chOff x="0" y="0"/>
+          <a:chExt cx="0" cy="0"/>
+        </a:xfrm>
+      </p:grpSpPr>
+      <p:sp>
+        <p:nvSpPr>
+          <p:cNvPr id="7" name="Title 6"/>
+          <p:cNvSpPr>
+            <a:spLocks noGrp="1"/>
+          </p:cNvSpPr>
+          <p:nvPr>
+            <p:ph type="title"/>
+          </p:nvPr>
+        </p:nvSpPr>
+        <p:spPr/>
+        <p:txBody>
+          <a:bodyPr/>
+          <a:lstStyle/>
+          <a:p>
+            <a:r>
+              <a:rPr lang="en-US" dirty="0"/>
+              <a:t>BRANCHES</a:t>
+            </a:r>
+          </a:p>
+        </p:txBody>
+      </p:sp>
+      <p:sp>
+        <p:nvSpPr>
+          <p:cNvPr id="8" name="Content Placeholder 7"/>
+          <p:cNvSpPr>
+            <a:spLocks noGrp="1"/>
+          </p:cNvSpPr>
+          <p:nvPr>
+            <p:ph idx="1"/>
+          </p:nvPr>
+        </p:nvSpPr>
+        <p:spPr>
+          <a:xfrm>
+            <a:off x="838200" y="1825625"/>
+            <a:ext cx="4947745" cy="4351338"/>
+          </a:xfrm>
+        </p:spPr>
+        <p:txBody>
+          <a:bodyPr/>
+          <a:lstStyle/>
+          <a:p>
+            <a:r>
+              <a:rPr lang="en-US" dirty="0"/>
+              <a:t>If you’re working on different features or as part of a larger team</a:t>
+            </a:r>
+          </a:p>
+          <a:p>
+            <a:r>
+              <a:rPr lang="en-US" dirty="0"/>
+              <a:t>Divergent history</a:t>
+            </a:r>
+          </a:p>
+          <a:p>
+            <a:r>
+              <a:rPr lang="en-US" dirty="0"/>
+              <a:t>Independent files</a:t>
+            </a:r>
+          </a:p>
+          <a:p>
+            <a:pPr lvl="1"/>
+            <a:r>
+              <a:rPr lang="en-US" dirty="0"/>
+              <a:t>Avoids unintended consequences!</a:t>
+            </a:r>
+          </a:p>
+          <a:p>
+            <a:r>
+              <a:rPr lang="en-US" dirty="0"/>
+              <a:t>Easy integration</a:t>
+            </a:r>
+          </a:p>
+        </p:txBody>
+      </p:sp>
+      <p:sp>
+        <p:nvSpPr>
+          <p:cNvPr id="4" name="Date Placeholder 3"/>
+          <p:cNvSpPr>
+            <a:spLocks noGrp="1"/>
+          </p:cNvSpPr>
+          <p:nvPr>
+            <p:ph type="dt" sz="half" idx="10"/>
+          </p:nvPr>
+        </p:nvSpPr>
+        <p:spPr/>
+        <p:txBody>
+          <a:bodyPr/>
+          <a:lstStyle/>
+          <a:p>
+            <a:fld id="{930E186A-0FBF-4DA6-A71A-C325C944F843}" type="datetime4">
+              <a:rPr lang="en-US" smtClean="0"/>
+              <a:t>June 12, 2019</a:t>
+            </a:fld>
+            <a:endParaRPr lang="en-US" dirty="0"/>
+          </a:p>
+        </p:txBody>
+      </p:sp>
+      <p:sp>
+        <p:nvSpPr>
+          <p:cNvPr id="5" name="Footer Placeholder 4"/>
+          <p:cNvSpPr>
+            <a:spLocks noGrp="1"/>
+          </p:cNvSpPr>
+          <p:nvPr>
+            <p:ph type="ftr" sz="quarter" idx="11"/>
+          </p:nvPr>
+        </p:nvSpPr>
+        <p:spPr/>
+        <p:txBody>
+          <a:bodyPr/>
+          <a:lstStyle/>
+          <a:p>
+            <a:r>
+              <a:rPr lang="en-US"/>
+              <a:t>Digital Scholarship Services </a:t>
+            </a:r>
+            <a:r>
+              <a:rPr lang="en-US">
+                <a:solidFill>
+                  <a:schemeClr val="accent1">
+                    <a:lumMod val="50000"/>
+                  </a:schemeClr>
+                </a:solidFill>
+              </a:rPr>
+              <a:t>| Email</a:t>
+            </a:r>
+            <a:r>
+              <a:rPr lang="en-US"/>
+              <a:t> cf24@rice.edu </a:t>
+            </a:r>
+            <a:r>
+              <a:rPr lang="en-US">
+                <a:solidFill>
+                  <a:schemeClr val="accent1">
+                    <a:lumMod val="50000"/>
+                  </a:schemeClr>
+                </a:solidFill>
+              </a:rPr>
+              <a:t>|</a:t>
+            </a:r>
+            <a:r>
+              <a:rPr lang="en-US"/>
+              <a:t> library.rice.edu/dss</a:t>
+            </a:r>
+            <a:endParaRPr lang="en-US" dirty="0"/>
+          </a:p>
+        </p:txBody>
+      </p:sp>
+      <p:sp>
+        <p:nvSpPr>
+          <p:cNvPr id="6" name="Slide Number Placeholder 5"/>
+          <p:cNvSpPr>
+            <a:spLocks noGrp="1"/>
+          </p:cNvSpPr>
+          <p:nvPr>
+            <p:ph type="sldNum" sz="quarter" idx="12"/>
+          </p:nvPr>
+        </p:nvSpPr>
+        <p:spPr/>
+        <p:txBody>
+          <a:bodyPr/>
+          <a:lstStyle/>
+          <a:p>
+            <a:fld id="{D57F1E4F-1CFF-5643-939E-02111984F565}" type="slidenum">
+              <a:rPr lang="en-US" smtClean="0"/>
+              <a:t>35</a:t>
             </a:fld>
             <a:endParaRPr lang="en-US" dirty="0"/>
           </a:p>
@@ -9815,7 +10318,7 @@
 </p:sld>
 </file>
 
-<file path=ppt/slides/slide34.xml><?xml version="1.0" encoding="utf-8"?>
+<file path=ppt/slides/slide36.xml><?xml version="1.0" encoding="utf-8"?>
 <p:sld xmlns:a="http://schemas.openxmlformats.org/drawingml/2006/main" xmlns:r="http://schemas.openxmlformats.org/officeDocument/2006/relationships" xmlns:p="http://schemas.openxmlformats.org/presentationml/2006/main">
   <p:cSld>
     <p:spTree>
@@ -9910,7 +10413,7 @@
           <a:p>
             <a:fld id="{74F93749-3CD2-4A95-98ED-FE9E109683BE}" type="datetime4">
               <a:rPr lang="en-US" smtClean="0"/>
-              <a:t>June 6, 2019</a:t>
+              <a:t>June 12, 2019</a:t>
             </a:fld>
             <a:endParaRPr lang="en-US" dirty="0"/>
           </a:p>
@@ -9984,7 +10487,7 @@
           <a:p>
             <a:fld id="{D57F1E4F-1CFF-5643-939E-02111984F565}" type="slidenum">
               <a:rPr lang="en-US" smtClean="0"/>
-              <a:t>34</a:t>
+              <a:t>36</a:t>
             </a:fld>
             <a:endParaRPr lang="en-US" dirty="0"/>
           </a:p>
@@ -10085,7 +10588,7 @@
 </p:sld>
 </file>
 
-<file path=ppt/slides/slide35.xml><?xml version="1.0" encoding="utf-8"?>
+<file path=ppt/slides/slide37.xml><?xml version="1.0" encoding="utf-8"?>
 <p:sld xmlns:a="http://schemas.openxmlformats.org/drawingml/2006/main" xmlns:r="http://schemas.openxmlformats.org/officeDocument/2006/relationships" xmlns:p="http://schemas.openxmlformats.org/presentationml/2006/main">
   <p:cSld>
     <p:spTree>
@@ -10174,7 +10677,7 @@
           <a:p>
             <a:fld id="{74F93749-3CD2-4A95-98ED-FE9E109683BE}" type="datetime4">
               <a:rPr lang="en-US" smtClean="0"/>
-              <a:t>June 6, 2019</a:t>
+              <a:t>June 12, 2019</a:t>
             </a:fld>
             <a:endParaRPr lang="en-US" dirty="0"/>
           </a:p>
@@ -10248,7 +10751,7 @@
           <a:p>
             <a:fld id="{D57F1E4F-1CFF-5643-939E-02111984F565}" type="slidenum">
               <a:rPr lang="en-US" smtClean="0"/>
-              <a:t>35</a:t>
+              <a:t>37</a:t>
             </a:fld>
             <a:endParaRPr lang="en-US" dirty="0"/>
           </a:p>
@@ -10347,7 +10850,7 @@
 </p:sld>
 </file>
 
-<file path=ppt/slides/slide36.xml><?xml version="1.0" encoding="utf-8"?>
+<file path=ppt/slides/slide38.xml><?xml version="1.0" encoding="utf-8"?>
 <p:sld xmlns:a="http://schemas.openxmlformats.org/drawingml/2006/main" xmlns:r="http://schemas.openxmlformats.org/officeDocument/2006/relationships" xmlns:p="http://schemas.openxmlformats.org/presentationml/2006/main">
   <p:cSld>
     <p:spTree>
@@ -10403,7 +10906,7 @@
           <a:p>
             <a:fld id="{74F93749-3CD2-4A95-98ED-FE9E109683BE}" type="datetime4">
               <a:rPr lang="en-US" smtClean="0"/>
-              <a:t>June 6, 2019</a:t>
+              <a:t>June 12, 2019</a:t>
             </a:fld>
             <a:endParaRPr lang="en-US" dirty="0"/>
           </a:p>
@@ -10477,7 +10980,7 @@
           <a:p>
             <a:fld id="{D57F1E4F-1CFF-5643-939E-02111984F565}" type="slidenum">
               <a:rPr lang="en-US" smtClean="0"/>
-              <a:t>36</a:t>
+              <a:t>38</a:t>
             </a:fld>
             <a:endParaRPr lang="en-US" dirty="0"/>
           </a:p>
@@ -10542,7 +11045,7 @@
 </p:sld>
 </file>
 
-<file path=ppt/slides/slide37.xml><?xml version="1.0" encoding="utf-8"?>
+<file path=ppt/slides/slide39.xml><?xml version="1.0" encoding="utf-8"?>
 <p:sld xmlns:a="http://schemas.openxmlformats.org/drawingml/2006/main" xmlns:r="http://schemas.openxmlformats.org/officeDocument/2006/relationships" xmlns:p="http://schemas.openxmlformats.org/presentationml/2006/main">
   <p:cSld>
     <p:spTree>
@@ -10598,7 +11101,7 @@
           <a:p>
             <a:fld id="{74F93749-3CD2-4A95-98ED-FE9E109683BE}" type="datetime4">
               <a:rPr lang="en-US" smtClean="0"/>
-              <a:t>June 6, 2019</a:t>
+              <a:t>June 12, 2019</a:t>
             </a:fld>
             <a:endParaRPr lang="en-US" dirty="0"/>
           </a:p>
@@ -10672,7 +11175,7 @@
           <a:p>
             <a:fld id="{D57F1E4F-1CFF-5643-939E-02111984F565}" type="slidenum">
               <a:rPr lang="en-US" smtClean="0"/>
-              <a:t>37</a:t>
+              <a:t>39</a:t>
             </a:fld>
             <a:endParaRPr lang="en-US" dirty="0"/>
           </a:p>
@@ -11104,7 +11607,7 @@
 </p:sld>
 </file>
 
-<file path=ppt/slides/slide38.xml><?xml version="1.0" encoding="utf-8"?>
+<file path=ppt/slides/slide4.xml><?xml version="1.0" encoding="utf-8"?>
 <p:sld xmlns:a="http://schemas.openxmlformats.org/drawingml/2006/main" xmlns:r="http://schemas.openxmlformats.org/officeDocument/2006/relationships" xmlns:p="http://schemas.openxmlformats.org/presentationml/2006/main">
   <p:cSld>
     <p:spTree>
@@ -11137,62 +11640,46 @@
           <a:lstStyle/>
           <a:p>
             <a:r>
-              <a:rPr lang="en-US" dirty="0"/>
-              <a:t>CONFLICTS</a:t>
-            </a:r>
-          </a:p>
-        </p:txBody>
-      </p:sp>
-      <p:sp>
-        <p:nvSpPr>
-          <p:cNvPr id="3" name="Content Placeholder 2"/>
-          <p:cNvSpPr>
-            <a:spLocks noGrp="1"/>
-          </p:cNvSpPr>
+              <a:rPr lang="en-US" dirty="0">
+                <a:latin typeface="+mn-lt"/>
+              </a:rPr>
+              <a:t>WHAT IS GITHUB?</a:t>
+            </a:r>
+          </a:p>
+        </p:txBody>
+      </p:sp>
+      <p:pic>
+        <p:nvPicPr>
+          <p:cNvPr id="8" name="Content Placeholder 7">
+            <a:extLst>
+              <a:ext uri="{FF2B5EF4-FFF2-40B4-BE49-F238E27FC236}">
+                <a16:creationId xmlns:a16="http://schemas.microsoft.com/office/drawing/2014/main" id="{55F5BDAA-3BD0-4E79-AC0F-46319E23DD68}"/>
+              </a:ext>
+            </a:extLst>
+          </p:cNvPr>
+          <p:cNvPicPr>
+            <a:picLocks noGrp="1" noChangeAspect="1"/>
+          </p:cNvPicPr>
           <p:nvPr>
             <p:ph idx="1"/>
           </p:nvPr>
-        </p:nvSpPr>
+        </p:nvPicPr>
+        <p:blipFill>
+          <a:blip r:embed="rId2"/>
+          <a:stretch>
+            <a:fillRect/>
+          </a:stretch>
+        </p:blipFill>
         <p:spPr>
           <a:xfrm>
-            <a:off x="838200" y="1825625"/>
-            <a:ext cx="5404945" cy="4351338"/>
+            <a:off x="7699071" y="1347343"/>
+            <a:ext cx="3249594" cy="2701225"/>
           </a:xfrm>
         </p:spPr>
-        <p:txBody>
-          <a:bodyPr/>
-          <a:lstStyle/>
-          <a:p>
-            <a:r>
-              <a:rPr lang="en-US" dirty="0"/>
-              <a:t>Occasionally, two people may have edited the same </a:t>
-            </a:r>
-            <a:r>
-              <a:rPr lang="en-US" dirty="0" smtClean="0"/>
-              <a:t>part of the same file </a:t>
-            </a:r>
-            <a:r>
-              <a:rPr lang="en-US" dirty="0"/>
-              <a:t>on different branches</a:t>
-            </a:r>
-          </a:p>
-          <a:p>
-            <a:r>
-              <a:rPr lang="en-US" dirty="0"/>
-              <a:t>Which version do we take?</a:t>
-            </a:r>
-          </a:p>
-          <a:p>
-            <a:r>
-              <a:rPr lang="en-US" dirty="0"/>
-              <a:t>Must manually resolve conflicts</a:t>
-            </a:r>
-          </a:p>
-        </p:txBody>
-      </p:sp>
-      <p:sp>
-        <p:nvSpPr>
-          <p:cNvPr id="4" name="Date Placeholder 3"/>
+      </p:pic>
+      <p:sp>
+        <p:nvSpPr>
+          <p:cNvPr id="5" name="Date Placeholder 4"/>
           <p:cNvSpPr>
             <a:spLocks noGrp="1"/>
           </p:cNvSpPr>
@@ -11205,9 +11692,9 @@
           <a:bodyPr/>
           <a:lstStyle/>
           <a:p>
-            <a:fld id="{74F93749-3CD2-4A95-98ED-FE9E109683BE}" type="datetime4">
+            <a:fld id="{ABCDBDCF-BD7C-42D5-AA45-BDAC8FAB55A4}" type="datetime4">
               <a:rPr lang="en-US" smtClean="0"/>
-              <a:t>June 6, 2019</a:t>
+              <a:t>June 12, 2019</a:t>
             </a:fld>
             <a:endParaRPr lang="en-US" dirty="0"/>
           </a:p>
@@ -11215,7 +11702,30 @@
       </p:sp>
       <p:sp>
         <p:nvSpPr>
-          <p:cNvPr id="5" name="Footer Placeholder 4"/>
+          <p:cNvPr id="6" name="Slide Number Placeholder 5"/>
+          <p:cNvSpPr>
+            <a:spLocks noGrp="1"/>
+          </p:cNvSpPr>
+          <p:nvPr>
+            <p:ph type="sldNum" sz="quarter" idx="12"/>
+          </p:nvPr>
+        </p:nvSpPr>
+        <p:spPr/>
+        <p:txBody>
+          <a:bodyPr/>
+          <a:lstStyle/>
+          <a:p>
+            <a:fld id="{D57F1E4F-1CFF-5643-939E-02111984F565}" type="slidenum">
+              <a:rPr lang="en-US" smtClean="0"/>
+              <a:t>4</a:t>
+            </a:fld>
+            <a:endParaRPr lang="en-US" dirty="0"/>
+          </a:p>
+        </p:txBody>
+      </p:sp>
+      <p:sp>
+        <p:nvSpPr>
+          <p:cNvPr id="7" name="Footer Placeholder 6"/>
           <p:cNvSpPr>
             <a:spLocks noGrp="1"/>
           </p:cNvSpPr>
@@ -11264,6 +11774,454 @@
           </a:p>
         </p:txBody>
       </p:sp>
+      <p:pic>
+        <p:nvPicPr>
+          <p:cNvPr id="10" name="Picture 9">
+            <a:extLst>
+              <a:ext uri="{FF2B5EF4-FFF2-40B4-BE49-F238E27FC236}">
+                <a16:creationId xmlns:a16="http://schemas.microsoft.com/office/drawing/2014/main" id="{60B37E9D-2C05-4A2E-8CBE-F38BAD4C28A3}"/>
+              </a:ext>
+            </a:extLst>
+          </p:cNvPr>
+          <p:cNvPicPr>
+            <a:picLocks noChangeAspect="1"/>
+          </p:cNvPicPr>
+          <p:nvPr/>
+        </p:nvPicPr>
+        <p:blipFill>
+          <a:blip r:embed="rId3"/>
+          <a:stretch>
+            <a:fillRect/>
+          </a:stretch>
+        </p:blipFill>
+        <p:spPr>
+          <a:xfrm>
+            <a:off x="6649090" y="3715575"/>
+            <a:ext cx="5349555" cy="2193317"/>
+          </a:xfrm>
+          <a:prstGeom prst="rect">
+            <a:avLst/>
+          </a:prstGeom>
+        </p:spPr>
+      </p:pic>
+      <p:sp>
+        <p:nvSpPr>
+          <p:cNvPr id="11" name="Content Placeholder 2">
+            <a:extLst>
+              <a:ext uri="{FF2B5EF4-FFF2-40B4-BE49-F238E27FC236}">
+                <a16:creationId xmlns:a16="http://schemas.microsoft.com/office/drawing/2014/main" id="{FE1B108A-3F0D-4D42-A4B2-178657E7D869}"/>
+              </a:ext>
+            </a:extLst>
+          </p:cNvPr>
+          <p:cNvSpPr txBox="1">
+            <a:spLocks/>
+          </p:cNvSpPr>
+          <p:nvPr/>
+        </p:nvSpPr>
+        <p:spPr>
+          <a:xfrm>
+            <a:off x="838200" y="1825625"/>
+            <a:ext cx="5199529" cy="4351338"/>
+          </a:xfrm>
+          <a:prstGeom prst="rect">
+            <a:avLst/>
+          </a:prstGeom>
+        </p:spPr>
+        <p:txBody>
+          <a:bodyPr vert="horz" lIns="91440" tIns="45720" rIns="91440" bIns="45720" rtlCol="0">
+            <a:normAutofit/>
+          </a:bodyPr>
+          <a:lstStyle>
+            <a:lvl1pPr marL="228600" indent="-228600" algn="l" defTabSz="914400" rtl="0" eaLnBrk="1" latinLnBrk="0" hangingPunct="1">
+              <a:lnSpc>
+                <a:spcPct val="90000"/>
+              </a:lnSpc>
+              <a:spcBef>
+                <a:spcPts val="1000"/>
+              </a:spcBef>
+              <a:buFont typeface="Arial" panose="020B0604020202020204" pitchFamily="34" charset="0"/>
+              <a:buChar char="•"/>
+              <a:defRPr sz="2800" kern="1200">
+                <a:solidFill>
+                  <a:schemeClr val="tx1"/>
+                </a:solidFill>
+                <a:latin typeface="+mn-lt"/>
+                <a:ea typeface="+mn-ea"/>
+                <a:cs typeface="+mn-cs"/>
+              </a:defRPr>
+            </a:lvl1pPr>
+            <a:lvl2pPr marL="685800" indent="-228600" algn="l" defTabSz="914400" rtl="0" eaLnBrk="1" latinLnBrk="0" hangingPunct="1">
+              <a:lnSpc>
+                <a:spcPct val="90000"/>
+              </a:lnSpc>
+              <a:spcBef>
+                <a:spcPts val="500"/>
+              </a:spcBef>
+              <a:buFont typeface="Arial" panose="020B0604020202020204" pitchFamily="34" charset="0"/>
+              <a:buChar char="•"/>
+              <a:defRPr sz="2400" kern="1200">
+                <a:solidFill>
+                  <a:schemeClr val="tx1"/>
+                </a:solidFill>
+                <a:latin typeface="+mn-lt"/>
+                <a:ea typeface="+mn-ea"/>
+                <a:cs typeface="+mn-cs"/>
+              </a:defRPr>
+            </a:lvl2pPr>
+            <a:lvl3pPr marL="1143000" indent="-228600" algn="l" defTabSz="914400" rtl="0" eaLnBrk="1" latinLnBrk="0" hangingPunct="1">
+              <a:lnSpc>
+                <a:spcPct val="90000"/>
+              </a:lnSpc>
+              <a:spcBef>
+                <a:spcPts val="500"/>
+              </a:spcBef>
+              <a:buFont typeface="Arial" panose="020B0604020202020204" pitchFamily="34" charset="0"/>
+              <a:buChar char="•"/>
+              <a:defRPr sz="2000" kern="1200">
+                <a:solidFill>
+                  <a:schemeClr val="tx1"/>
+                </a:solidFill>
+                <a:latin typeface="+mn-lt"/>
+                <a:ea typeface="+mn-ea"/>
+                <a:cs typeface="+mn-cs"/>
+              </a:defRPr>
+            </a:lvl3pPr>
+            <a:lvl4pPr marL="1600200" indent="-228600" algn="l" defTabSz="914400" rtl="0" eaLnBrk="1" latinLnBrk="0" hangingPunct="1">
+              <a:lnSpc>
+                <a:spcPct val="90000"/>
+              </a:lnSpc>
+              <a:spcBef>
+                <a:spcPts val="500"/>
+              </a:spcBef>
+              <a:buFont typeface="Arial" panose="020B0604020202020204" pitchFamily="34" charset="0"/>
+              <a:buChar char="•"/>
+              <a:defRPr sz="1800" kern="1200">
+                <a:solidFill>
+                  <a:schemeClr val="tx1"/>
+                </a:solidFill>
+                <a:latin typeface="+mn-lt"/>
+                <a:ea typeface="+mn-ea"/>
+                <a:cs typeface="+mn-cs"/>
+              </a:defRPr>
+            </a:lvl4pPr>
+            <a:lvl5pPr marL="2057400" indent="-228600" algn="l" defTabSz="914400" rtl="0" eaLnBrk="1" latinLnBrk="0" hangingPunct="1">
+              <a:lnSpc>
+                <a:spcPct val="90000"/>
+              </a:lnSpc>
+              <a:spcBef>
+                <a:spcPts val="500"/>
+              </a:spcBef>
+              <a:buFont typeface="Arial" panose="020B0604020202020204" pitchFamily="34" charset="0"/>
+              <a:buChar char="•"/>
+              <a:defRPr sz="1800" kern="1200">
+                <a:solidFill>
+                  <a:schemeClr val="tx1"/>
+                </a:solidFill>
+                <a:latin typeface="+mn-lt"/>
+                <a:ea typeface="+mn-ea"/>
+                <a:cs typeface="+mn-cs"/>
+              </a:defRPr>
+            </a:lvl5pPr>
+            <a:lvl6pPr marL="2514600" indent="-228600" algn="l" defTabSz="914400" rtl="0" eaLnBrk="1" latinLnBrk="0" hangingPunct="1">
+              <a:lnSpc>
+                <a:spcPct val="90000"/>
+              </a:lnSpc>
+              <a:spcBef>
+                <a:spcPts val="500"/>
+              </a:spcBef>
+              <a:buFont typeface="Arial" panose="020B0604020202020204" pitchFamily="34" charset="0"/>
+              <a:buChar char="•"/>
+              <a:defRPr sz="1800" kern="1200">
+                <a:solidFill>
+                  <a:schemeClr val="tx1"/>
+                </a:solidFill>
+                <a:latin typeface="+mn-lt"/>
+                <a:ea typeface="+mn-ea"/>
+                <a:cs typeface="+mn-cs"/>
+              </a:defRPr>
+            </a:lvl6pPr>
+            <a:lvl7pPr marL="2971800" indent="-228600" algn="l" defTabSz="914400" rtl="0" eaLnBrk="1" latinLnBrk="0" hangingPunct="1">
+              <a:lnSpc>
+                <a:spcPct val="90000"/>
+              </a:lnSpc>
+              <a:spcBef>
+                <a:spcPts val="500"/>
+              </a:spcBef>
+              <a:buFont typeface="Arial" panose="020B0604020202020204" pitchFamily="34" charset="0"/>
+              <a:buChar char="•"/>
+              <a:defRPr sz="1800" kern="1200">
+                <a:solidFill>
+                  <a:schemeClr val="tx1"/>
+                </a:solidFill>
+                <a:latin typeface="+mn-lt"/>
+                <a:ea typeface="+mn-ea"/>
+                <a:cs typeface="+mn-cs"/>
+              </a:defRPr>
+            </a:lvl7pPr>
+            <a:lvl8pPr marL="3429000" indent="-228600" algn="l" defTabSz="914400" rtl="0" eaLnBrk="1" latinLnBrk="0" hangingPunct="1">
+              <a:lnSpc>
+                <a:spcPct val="90000"/>
+              </a:lnSpc>
+              <a:spcBef>
+                <a:spcPts val="500"/>
+              </a:spcBef>
+              <a:buFont typeface="Arial" panose="020B0604020202020204" pitchFamily="34" charset="0"/>
+              <a:buChar char="•"/>
+              <a:defRPr sz="1800" kern="1200">
+                <a:solidFill>
+                  <a:schemeClr val="tx1"/>
+                </a:solidFill>
+                <a:latin typeface="+mn-lt"/>
+                <a:ea typeface="+mn-ea"/>
+                <a:cs typeface="+mn-cs"/>
+              </a:defRPr>
+            </a:lvl8pPr>
+            <a:lvl9pPr marL="3886200" indent="-228600" algn="l" defTabSz="914400" rtl="0" eaLnBrk="1" latinLnBrk="0" hangingPunct="1">
+              <a:lnSpc>
+                <a:spcPct val="90000"/>
+              </a:lnSpc>
+              <a:spcBef>
+                <a:spcPts val="500"/>
+              </a:spcBef>
+              <a:buFont typeface="Arial" panose="020B0604020202020204" pitchFamily="34" charset="0"/>
+              <a:buChar char="•"/>
+              <a:defRPr sz="1800" kern="1200">
+                <a:solidFill>
+                  <a:schemeClr val="tx1"/>
+                </a:solidFill>
+                <a:latin typeface="+mn-lt"/>
+                <a:ea typeface="+mn-ea"/>
+                <a:cs typeface="+mn-cs"/>
+              </a:defRPr>
+            </a:lvl9pPr>
+          </a:lstStyle>
+          <a:p>
+            <a:r>
+              <a:rPr lang="en-US" dirty="0"/>
+              <a:t>The largest host for Git repositories</a:t>
+            </a:r>
+          </a:p>
+          <a:p>
+            <a:r>
+              <a:rPr lang="en-US" dirty="0"/>
+              <a:t>Free (for public repositories)</a:t>
+            </a:r>
+          </a:p>
+          <a:p>
+            <a:r>
+              <a:rPr lang="en-US" dirty="0"/>
+              <a:t>A great place to collaborate</a:t>
+            </a:r>
+          </a:p>
+          <a:p>
+            <a:pPr lvl="1"/>
+            <a:r>
+              <a:rPr lang="en-US" dirty="0"/>
+              <a:t>Support for unique features</a:t>
+            </a:r>
+          </a:p>
+          <a:p>
+            <a:pPr lvl="1"/>
+            <a:r>
+              <a:rPr lang="en-US" dirty="0"/>
+              <a:t>Comment sections</a:t>
+            </a:r>
+          </a:p>
+          <a:p>
+            <a:pPr lvl="1"/>
+            <a:r>
+              <a:rPr lang="en-US" dirty="0"/>
+              <a:t>Organizations</a:t>
+            </a:r>
+          </a:p>
+          <a:p>
+            <a:pPr lvl="1"/>
+            <a:r>
+              <a:rPr lang="en-US" dirty="0"/>
+              <a:t>Issue tracking</a:t>
+            </a:r>
+          </a:p>
+          <a:p>
+            <a:r>
+              <a:rPr lang="en-US" dirty="0"/>
+              <a:t>Extensible!</a:t>
+            </a:r>
+          </a:p>
+        </p:txBody>
+      </p:sp>
+    </p:spTree>
+    <p:extLst>
+      <p:ext uri="{BB962C8B-B14F-4D97-AF65-F5344CB8AC3E}">
+        <p14:creationId xmlns:p14="http://schemas.microsoft.com/office/powerpoint/2010/main" val="2155920567"/>
+      </p:ext>
+    </p:extLst>
+  </p:cSld>
+  <p:clrMapOvr>
+    <a:masterClrMapping/>
+  </p:clrMapOvr>
+</p:sld>
+</file>
+
+<file path=ppt/slides/slide40.xml><?xml version="1.0" encoding="utf-8"?>
+<p:sld xmlns:a="http://schemas.openxmlformats.org/drawingml/2006/main" xmlns:r="http://schemas.openxmlformats.org/officeDocument/2006/relationships" xmlns:p="http://schemas.openxmlformats.org/presentationml/2006/main">
+  <p:cSld>
+    <p:spTree>
+      <p:nvGrpSpPr>
+        <p:cNvPr id="1" name=""/>
+        <p:cNvGrpSpPr/>
+        <p:nvPr/>
+      </p:nvGrpSpPr>
+      <p:grpSpPr>
+        <a:xfrm>
+          <a:off x="0" y="0"/>
+          <a:ext cx="0" cy="0"/>
+          <a:chOff x="0" y="0"/>
+          <a:chExt cx="0" cy="0"/>
+        </a:xfrm>
+      </p:grpSpPr>
+      <p:sp>
+        <p:nvSpPr>
+          <p:cNvPr id="2" name="Title 1"/>
+          <p:cNvSpPr>
+            <a:spLocks noGrp="1"/>
+          </p:cNvSpPr>
+          <p:nvPr>
+            <p:ph type="title"/>
+          </p:nvPr>
+        </p:nvSpPr>
+        <p:spPr/>
+        <p:txBody>
+          <a:bodyPr/>
+          <a:lstStyle/>
+          <a:p>
+            <a:r>
+              <a:rPr lang="en-US" dirty="0"/>
+              <a:t>CONFLICTS</a:t>
+            </a:r>
+          </a:p>
+        </p:txBody>
+      </p:sp>
+      <p:sp>
+        <p:nvSpPr>
+          <p:cNvPr id="3" name="Content Placeholder 2"/>
+          <p:cNvSpPr>
+            <a:spLocks noGrp="1"/>
+          </p:cNvSpPr>
+          <p:nvPr>
+            <p:ph idx="1"/>
+          </p:nvPr>
+        </p:nvSpPr>
+        <p:spPr>
+          <a:xfrm>
+            <a:off x="838200" y="1825625"/>
+            <a:ext cx="5404945" cy="4351338"/>
+          </a:xfrm>
+        </p:spPr>
+        <p:txBody>
+          <a:bodyPr/>
+          <a:lstStyle/>
+          <a:p>
+            <a:r>
+              <a:rPr lang="en-US" dirty="0"/>
+              <a:t>Occasionally, two people may have edited the same </a:t>
+            </a:r>
+            <a:r>
+              <a:rPr lang="en-US" dirty="0" smtClean="0"/>
+              <a:t>part of the same file </a:t>
+            </a:r>
+            <a:r>
+              <a:rPr lang="en-US" dirty="0"/>
+              <a:t>on different branches</a:t>
+            </a:r>
+          </a:p>
+          <a:p>
+            <a:r>
+              <a:rPr lang="en-US" dirty="0"/>
+              <a:t>Which version do we take?</a:t>
+            </a:r>
+          </a:p>
+          <a:p>
+            <a:r>
+              <a:rPr lang="en-US" dirty="0"/>
+              <a:t>Must manually resolve conflicts</a:t>
+            </a:r>
+          </a:p>
+        </p:txBody>
+      </p:sp>
+      <p:sp>
+        <p:nvSpPr>
+          <p:cNvPr id="4" name="Date Placeholder 3"/>
+          <p:cNvSpPr>
+            <a:spLocks noGrp="1"/>
+          </p:cNvSpPr>
+          <p:nvPr>
+            <p:ph type="dt" sz="half" idx="10"/>
+          </p:nvPr>
+        </p:nvSpPr>
+        <p:spPr/>
+        <p:txBody>
+          <a:bodyPr/>
+          <a:lstStyle/>
+          <a:p>
+            <a:fld id="{74F93749-3CD2-4A95-98ED-FE9E109683BE}" type="datetime4">
+              <a:rPr lang="en-US" smtClean="0"/>
+              <a:t>June 12, 2019</a:t>
+            </a:fld>
+            <a:endParaRPr lang="en-US" dirty="0"/>
+          </a:p>
+        </p:txBody>
+      </p:sp>
+      <p:sp>
+        <p:nvSpPr>
+          <p:cNvPr id="5" name="Footer Placeholder 4"/>
+          <p:cNvSpPr>
+            <a:spLocks noGrp="1"/>
+          </p:cNvSpPr>
+          <p:nvPr>
+            <p:ph type="ftr" sz="quarter" idx="11"/>
+          </p:nvPr>
+        </p:nvSpPr>
+        <p:spPr/>
+        <p:txBody>
+          <a:bodyPr/>
+          <a:lstStyle/>
+          <a:p>
+            <a:r>
+              <a:rPr lang="en-US"/>
+              <a:t>Digital Scholarship Services </a:t>
+            </a:r>
+            <a:r>
+              <a:rPr lang="en-US">
+                <a:solidFill>
+                  <a:schemeClr val="accent1">
+                    <a:lumMod val="50000"/>
+                  </a:schemeClr>
+                </a:solidFill>
+              </a:rPr>
+              <a:t>| Email</a:t>
+            </a:r>
+            <a:r>
+              <a:rPr lang="en-US"/>
+              <a:t> cf24@rice.edu </a:t>
+            </a:r>
+            <a:r>
+              <a:rPr lang="en-US">
+                <a:solidFill>
+                  <a:schemeClr val="accent1">
+                    <a:lumMod val="50000"/>
+                  </a:schemeClr>
+                </a:solidFill>
+              </a:rPr>
+              <a:t>|</a:t>
+            </a:r>
+            <a:r>
+              <a:rPr lang="en-US"/>
+              <a:t> library.rice.edu/dss</a:t>
+            </a:r>
+            <a:endParaRPr lang="en-US" dirty="0"/>
+          </a:p>
+        </p:txBody>
+      </p:sp>
       <p:sp>
         <p:nvSpPr>
           <p:cNvPr id="6" name="Slide Number Placeholder 5"/>
@@ -11281,7 +12239,7 @@
           <a:p>
             <a:fld id="{D57F1E4F-1CFF-5643-939E-02111984F565}" type="slidenum">
               <a:rPr lang="en-US" smtClean="0"/>
-              <a:t>38</a:t>
+              <a:t>40</a:t>
             </a:fld>
             <a:endParaRPr lang="en-US" dirty="0"/>
           </a:p>
@@ -11382,7 +12340,7 @@
 </p:sld>
 </file>
 
-<file path=ppt/slides/slide39.xml><?xml version="1.0" encoding="utf-8"?>
+<file path=ppt/slides/slide41.xml><?xml version="1.0" encoding="utf-8"?>
 <p:sld xmlns:a="http://schemas.openxmlformats.org/drawingml/2006/main" xmlns:r="http://schemas.openxmlformats.org/officeDocument/2006/relationships" xmlns:p="http://schemas.openxmlformats.org/presentationml/2006/main">
   <p:cSld>
     <p:spTree>
@@ -11438,7 +12396,7 @@
           <a:p>
             <a:fld id="{74F93749-3CD2-4A95-98ED-FE9E109683BE}" type="datetime4">
               <a:rPr lang="en-US" smtClean="0"/>
-              <a:t>June 6, 2019</a:t>
+              <a:t>June 12, 2019</a:t>
             </a:fld>
             <a:endParaRPr lang="en-US" dirty="0"/>
           </a:p>
@@ -11512,7 +12470,7 @@
           <a:p>
             <a:fld id="{D57F1E4F-1CFF-5643-939E-02111984F565}" type="slidenum">
               <a:rPr lang="en-US" smtClean="0"/>
-              <a:t>39</a:t>
+              <a:t>41</a:t>
             </a:fld>
             <a:endParaRPr lang="en-US" dirty="0"/>
           </a:p>
@@ -11832,7 +12790,7 @@
 </p:sld>
 </file>
 
-<file path=ppt/slides/slide4.xml><?xml version="1.0" encoding="utf-8"?>
+<file path=ppt/slides/slide42.xml><?xml version="1.0" encoding="utf-8"?>
 <p:sld xmlns:a="http://schemas.openxmlformats.org/drawingml/2006/main" xmlns:r="http://schemas.openxmlformats.org/officeDocument/2006/relationships" xmlns:p="http://schemas.openxmlformats.org/presentationml/2006/main">
   <p:cSld>
     <p:spTree>
@@ -11865,46 +12823,15 @@
           <a:lstStyle/>
           <a:p>
             <a:r>
-              <a:rPr lang="en-US" dirty="0">
-                <a:latin typeface="+mn-lt"/>
-              </a:rPr>
-              <a:t>WHAT IS GITHUB?</a:t>
-            </a:r>
-          </a:p>
-        </p:txBody>
-      </p:sp>
-      <p:pic>
-        <p:nvPicPr>
-          <p:cNvPr id="8" name="Content Placeholder 7">
-            <a:extLst>
-              <a:ext uri="{FF2B5EF4-FFF2-40B4-BE49-F238E27FC236}">
-                <a16:creationId xmlns:a16="http://schemas.microsoft.com/office/drawing/2014/main" id="{55F5BDAA-3BD0-4E79-AC0F-46319E23DD68}"/>
-              </a:ext>
-            </a:extLst>
-          </p:cNvPr>
-          <p:cNvPicPr>
-            <a:picLocks noGrp="1" noChangeAspect="1"/>
-          </p:cNvPicPr>
-          <p:nvPr>
-            <p:ph idx="1"/>
-          </p:nvPr>
-        </p:nvPicPr>
-        <p:blipFill>
-          <a:blip r:embed="rId2"/>
-          <a:stretch>
-            <a:fillRect/>
-          </a:stretch>
-        </p:blipFill>
-        <p:spPr>
-          <a:xfrm>
-            <a:off x="7699071" y="1347343"/>
-            <a:ext cx="3249594" cy="2701225"/>
-          </a:xfrm>
-        </p:spPr>
-      </p:pic>
-      <p:sp>
-        <p:nvSpPr>
-          <p:cNvPr id="5" name="Date Placeholder 4"/>
+              <a:rPr lang="en-US" dirty="0"/>
+              <a:t>CONFLICTS IN ACTION</a:t>
+            </a:r>
+          </a:p>
+        </p:txBody>
+      </p:sp>
+      <p:sp>
+        <p:nvSpPr>
+          <p:cNvPr id="4" name="Date Placeholder 3"/>
           <p:cNvSpPr>
             <a:spLocks noGrp="1"/>
           </p:cNvSpPr>
@@ -11917,9 +12844,9 @@
           <a:bodyPr/>
           <a:lstStyle/>
           <a:p>
-            <a:fld id="{ABCDBDCF-BD7C-42D5-AA45-BDAC8FAB55A4}" type="datetime4">
+            <a:fld id="{74F93749-3CD2-4A95-98ED-FE9E109683BE}" type="datetime4">
               <a:rPr lang="en-US" smtClean="0"/>
-              <a:t>June 6, 2019</a:t>
+              <a:t>June 12, 2019</a:t>
             </a:fld>
             <a:endParaRPr lang="en-US" dirty="0"/>
           </a:p>
@@ -11927,30 +12854,7 @@
       </p:sp>
       <p:sp>
         <p:nvSpPr>
-          <p:cNvPr id="6" name="Slide Number Placeholder 5"/>
-          <p:cNvSpPr>
-            <a:spLocks noGrp="1"/>
-          </p:cNvSpPr>
-          <p:nvPr>
-            <p:ph type="sldNum" sz="quarter" idx="12"/>
-          </p:nvPr>
-        </p:nvSpPr>
-        <p:spPr/>
-        <p:txBody>
-          <a:bodyPr/>
-          <a:lstStyle/>
-          <a:p>
-            <a:fld id="{D57F1E4F-1CFF-5643-939E-02111984F565}" type="slidenum">
-              <a:rPr lang="en-US" smtClean="0"/>
-              <a:t>4</a:t>
-            </a:fld>
-            <a:endParaRPr lang="en-US" dirty="0"/>
-          </a:p>
-        </p:txBody>
-      </p:sp>
-      <p:sp>
-        <p:nvSpPr>
-          <p:cNvPr id="7" name="Footer Placeholder 6"/>
+          <p:cNvPr id="5" name="Footer Placeholder 4"/>
           <p:cNvSpPr>
             <a:spLocks noGrp="1"/>
           </p:cNvSpPr>
@@ -11999,407 +12903,6 @@
           </a:p>
         </p:txBody>
       </p:sp>
-      <p:pic>
-        <p:nvPicPr>
-          <p:cNvPr id="10" name="Picture 9">
-            <a:extLst>
-              <a:ext uri="{FF2B5EF4-FFF2-40B4-BE49-F238E27FC236}">
-                <a16:creationId xmlns:a16="http://schemas.microsoft.com/office/drawing/2014/main" id="{60B37E9D-2C05-4A2E-8CBE-F38BAD4C28A3}"/>
-              </a:ext>
-            </a:extLst>
-          </p:cNvPr>
-          <p:cNvPicPr>
-            <a:picLocks noChangeAspect="1"/>
-          </p:cNvPicPr>
-          <p:nvPr/>
-        </p:nvPicPr>
-        <p:blipFill>
-          <a:blip r:embed="rId3"/>
-          <a:stretch>
-            <a:fillRect/>
-          </a:stretch>
-        </p:blipFill>
-        <p:spPr>
-          <a:xfrm>
-            <a:off x="6649090" y="3715575"/>
-            <a:ext cx="5349555" cy="2193317"/>
-          </a:xfrm>
-          <a:prstGeom prst="rect">
-            <a:avLst/>
-          </a:prstGeom>
-        </p:spPr>
-      </p:pic>
-      <p:sp>
-        <p:nvSpPr>
-          <p:cNvPr id="11" name="Content Placeholder 2">
-            <a:extLst>
-              <a:ext uri="{FF2B5EF4-FFF2-40B4-BE49-F238E27FC236}">
-                <a16:creationId xmlns:a16="http://schemas.microsoft.com/office/drawing/2014/main" id="{FE1B108A-3F0D-4D42-A4B2-178657E7D869}"/>
-              </a:ext>
-            </a:extLst>
-          </p:cNvPr>
-          <p:cNvSpPr txBox="1">
-            <a:spLocks/>
-          </p:cNvSpPr>
-          <p:nvPr/>
-        </p:nvSpPr>
-        <p:spPr>
-          <a:xfrm>
-            <a:off x="838200" y="1825625"/>
-            <a:ext cx="5199529" cy="4351338"/>
-          </a:xfrm>
-          <a:prstGeom prst="rect">
-            <a:avLst/>
-          </a:prstGeom>
-        </p:spPr>
-        <p:txBody>
-          <a:bodyPr vert="horz" lIns="91440" tIns="45720" rIns="91440" bIns="45720" rtlCol="0">
-            <a:normAutofit/>
-          </a:bodyPr>
-          <a:lstStyle>
-            <a:lvl1pPr marL="228600" indent="-228600" algn="l" defTabSz="914400" rtl="0" eaLnBrk="1" latinLnBrk="0" hangingPunct="1">
-              <a:lnSpc>
-                <a:spcPct val="90000"/>
-              </a:lnSpc>
-              <a:spcBef>
-                <a:spcPts val="1000"/>
-              </a:spcBef>
-              <a:buFont typeface="Arial" panose="020B0604020202020204" pitchFamily="34" charset="0"/>
-              <a:buChar char="•"/>
-              <a:defRPr sz="2800" kern="1200">
-                <a:solidFill>
-                  <a:schemeClr val="tx1"/>
-                </a:solidFill>
-                <a:latin typeface="+mn-lt"/>
-                <a:ea typeface="+mn-ea"/>
-                <a:cs typeface="+mn-cs"/>
-              </a:defRPr>
-            </a:lvl1pPr>
-            <a:lvl2pPr marL="685800" indent="-228600" algn="l" defTabSz="914400" rtl="0" eaLnBrk="1" latinLnBrk="0" hangingPunct="1">
-              <a:lnSpc>
-                <a:spcPct val="90000"/>
-              </a:lnSpc>
-              <a:spcBef>
-                <a:spcPts val="500"/>
-              </a:spcBef>
-              <a:buFont typeface="Arial" panose="020B0604020202020204" pitchFamily="34" charset="0"/>
-              <a:buChar char="•"/>
-              <a:defRPr sz="2400" kern="1200">
-                <a:solidFill>
-                  <a:schemeClr val="tx1"/>
-                </a:solidFill>
-                <a:latin typeface="+mn-lt"/>
-                <a:ea typeface="+mn-ea"/>
-                <a:cs typeface="+mn-cs"/>
-              </a:defRPr>
-            </a:lvl2pPr>
-            <a:lvl3pPr marL="1143000" indent="-228600" algn="l" defTabSz="914400" rtl="0" eaLnBrk="1" latinLnBrk="0" hangingPunct="1">
-              <a:lnSpc>
-                <a:spcPct val="90000"/>
-              </a:lnSpc>
-              <a:spcBef>
-                <a:spcPts val="500"/>
-              </a:spcBef>
-              <a:buFont typeface="Arial" panose="020B0604020202020204" pitchFamily="34" charset="0"/>
-              <a:buChar char="•"/>
-              <a:defRPr sz="2000" kern="1200">
-                <a:solidFill>
-                  <a:schemeClr val="tx1"/>
-                </a:solidFill>
-                <a:latin typeface="+mn-lt"/>
-                <a:ea typeface="+mn-ea"/>
-                <a:cs typeface="+mn-cs"/>
-              </a:defRPr>
-            </a:lvl3pPr>
-            <a:lvl4pPr marL="1600200" indent="-228600" algn="l" defTabSz="914400" rtl="0" eaLnBrk="1" latinLnBrk="0" hangingPunct="1">
-              <a:lnSpc>
-                <a:spcPct val="90000"/>
-              </a:lnSpc>
-              <a:spcBef>
-                <a:spcPts val="500"/>
-              </a:spcBef>
-              <a:buFont typeface="Arial" panose="020B0604020202020204" pitchFamily="34" charset="0"/>
-              <a:buChar char="•"/>
-              <a:defRPr sz="1800" kern="1200">
-                <a:solidFill>
-                  <a:schemeClr val="tx1"/>
-                </a:solidFill>
-                <a:latin typeface="+mn-lt"/>
-                <a:ea typeface="+mn-ea"/>
-                <a:cs typeface="+mn-cs"/>
-              </a:defRPr>
-            </a:lvl4pPr>
-            <a:lvl5pPr marL="2057400" indent="-228600" algn="l" defTabSz="914400" rtl="0" eaLnBrk="1" latinLnBrk="0" hangingPunct="1">
-              <a:lnSpc>
-                <a:spcPct val="90000"/>
-              </a:lnSpc>
-              <a:spcBef>
-                <a:spcPts val="500"/>
-              </a:spcBef>
-              <a:buFont typeface="Arial" panose="020B0604020202020204" pitchFamily="34" charset="0"/>
-              <a:buChar char="•"/>
-              <a:defRPr sz="1800" kern="1200">
-                <a:solidFill>
-                  <a:schemeClr val="tx1"/>
-                </a:solidFill>
-                <a:latin typeface="+mn-lt"/>
-                <a:ea typeface="+mn-ea"/>
-                <a:cs typeface="+mn-cs"/>
-              </a:defRPr>
-            </a:lvl5pPr>
-            <a:lvl6pPr marL="2514600" indent="-228600" algn="l" defTabSz="914400" rtl="0" eaLnBrk="1" latinLnBrk="0" hangingPunct="1">
-              <a:lnSpc>
-                <a:spcPct val="90000"/>
-              </a:lnSpc>
-              <a:spcBef>
-                <a:spcPts val="500"/>
-              </a:spcBef>
-              <a:buFont typeface="Arial" panose="020B0604020202020204" pitchFamily="34" charset="0"/>
-              <a:buChar char="•"/>
-              <a:defRPr sz="1800" kern="1200">
-                <a:solidFill>
-                  <a:schemeClr val="tx1"/>
-                </a:solidFill>
-                <a:latin typeface="+mn-lt"/>
-                <a:ea typeface="+mn-ea"/>
-                <a:cs typeface="+mn-cs"/>
-              </a:defRPr>
-            </a:lvl6pPr>
-            <a:lvl7pPr marL="2971800" indent="-228600" algn="l" defTabSz="914400" rtl="0" eaLnBrk="1" latinLnBrk="0" hangingPunct="1">
-              <a:lnSpc>
-                <a:spcPct val="90000"/>
-              </a:lnSpc>
-              <a:spcBef>
-                <a:spcPts val="500"/>
-              </a:spcBef>
-              <a:buFont typeface="Arial" panose="020B0604020202020204" pitchFamily="34" charset="0"/>
-              <a:buChar char="•"/>
-              <a:defRPr sz="1800" kern="1200">
-                <a:solidFill>
-                  <a:schemeClr val="tx1"/>
-                </a:solidFill>
-                <a:latin typeface="+mn-lt"/>
-                <a:ea typeface="+mn-ea"/>
-                <a:cs typeface="+mn-cs"/>
-              </a:defRPr>
-            </a:lvl7pPr>
-            <a:lvl8pPr marL="3429000" indent="-228600" algn="l" defTabSz="914400" rtl="0" eaLnBrk="1" latinLnBrk="0" hangingPunct="1">
-              <a:lnSpc>
-                <a:spcPct val="90000"/>
-              </a:lnSpc>
-              <a:spcBef>
-                <a:spcPts val="500"/>
-              </a:spcBef>
-              <a:buFont typeface="Arial" panose="020B0604020202020204" pitchFamily="34" charset="0"/>
-              <a:buChar char="•"/>
-              <a:defRPr sz="1800" kern="1200">
-                <a:solidFill>
-                  <a:schemeClr val="tx1"/>
-                </a:solidFill>
-                <a:latin typeface="+mn-lt"/>
-                <a:ea typeface="+mn-ea"/>
-                <a:cs typeface="+mn-cs"/>
-              </a:defRPr>
-            </a:lvl8pPr>
-            <a:lvl9pPr marL="3886200" indent="-228600" algn="l" defTabSz="914400" rtl="0" eaLnBrk="1" latinLnBrk="0" hangingPunct="1">
-              <a:lnSpc>
-                <a:spcPct val="90000"/>
-              </a:lnSpc>
-              <a:spcBef>
-                <a:spcPts val="500"/>
-              </a:spcBef>
-              <a:buFont typeface="Arial" panose="020B0604020202020204" pitchFamily="34" charset="0"/>
-              <a:buChar char="•"/>
-              <a:defRPr sz="1800" kern="1200">
-                <a:solidFill>
-                  <a:schemeClr val="tx1"/>
-                </a:solidFill>
-                <a:latin typeface="+mn-lt"/>
-                <a:ea typeface="+mn-ea"/>
-                <a:cs typeface="+mn-cs"/>
-              </a:defRPr>
-            </a:lvl9pPr>
-          </a:lstStyle>
-          <a:p>
-            <a:r>
-              <a:rPr lang="en-US" dirty="0"/>
-              <a:t>The largest host for Git repositories</a:t>
-            </a:r>
-          </a:p>
-          <a:p>
-            <a:r>
-              <a:rPr lang="en-US" dirty="0"/>
-              <a:t>Free (for public repositories)</a:t>
-            </a:r>
-          </a:p>
-          <a:p>
-            <a:r>
-              <a:rPr lang="en-US" dirty="0"/>
-              <a:t>A great place to collaborate</a:t>
-            </a:r>
-          </a:p>
-          <a:p>
-            <a:pPr lvl="1"/>
-            <a:r>
-              <a:rPr lang="en-US" dirty="0"/>
-              <a:t>Support for unique features</a:t>
-            </a:r>
-          </a:p>
-          <a:p>
-            <a:pPr lvl="1"/>
-            <a:r>
-              <a:rPr lang="en-US" dirty="0"/>
-              <a:t>Comment sections</a:t>
-            </a:r>
-          </a:p>
-          <a:p>
-            <a:pPr lvl="1"/>
-            <a:r>
-              <a:rPr lang="en-US" dirty="0"/>
-              <a:t>Organizations</a:t>
-            </a:r>
-          </a:p>
-          <a:p>
-            <a:pPr lvl="1"/>
-            <a:r>
-              <a:rPr lang="en-US" dirty="0"/>
-              <a:t>Issue tracking</a:t>
-            </a:r>
-          </a:p>
-          <a:p>
-            <a:r>
-              <a:rPr lang="en-US" dirty="0"/>
-              <a:t>Extensible!</a:t>
-            </a:r>
-          </a:p>
-        </p:txBody>
-      </p:sp>
-    </p:spTree>
-    <p:extLst>
-      <p:ext uri="{BB962C8B-B14F-4D97-AF65-F5344CB8AC3E}">
-        <p14:creationId xmlns:p14="http://schemas.microsoft.com/office/powerpoint/2010/main" val="2155920567"/>
-      </p:ext>
-    </p:extLst>
-  </p:cSld>
-  <p:clrMapOvr>
-    <a:masterClrMapping/>
-  </p:clrMapOvr>
-</p:sld>
-</file>
-
-<file path=ppt/slides/slide40.xml><?xml version="1.0" encoding="utf-8"?>
-<p:sld xmlns:a="http://schemas.openxmlformats.org/drawingml/2006/main" xmlns:r="http://schemas.openxmlformats.org/officeDocument/2006/relationships" xmlns:p="http://schemas.openxmlformats.org/presentationml/2006/main">
-  <p:cSld>
-    <p:spTree>
-      <p:nvGrpSpPr>
-        <p:cNvPr id="1" name=""/>
-        <p:cNvGrpSpPr/>
-        <p:nvPr/>
-      </p:nvGrpSpPr>
-      <p:grpSpPr>
-        <a:xfrm>
-          <a:off x="0" y="0"/>
-          <a:ext cx="0" cy="0"/>
-          <a:chOff x="0" y="0"/>
-          <a:chExt cx="0" cy="0"/>
-        </a:xfrm>
-      </p:grpSpPr>
-      <p:sp>
-        <p:nvSpPr>
-          <p:cNvPr id="2" name="Title 1"/>
-          <p:cNvSpPr>
-            <a:spLocks noGrp="1"/>
-          </p:cNvSpPr>
-          <p:nvPr>
-            <p:ph type="title"/>
-          </p:nvPr>
-        </p:nvSpPr>
-        <p:spPr/>
-        <p:txBody>
-          <a:bodyPr/>
-          <a:lstStyle/>
-          <a:p>
-            <a:r>
-              <a:rPr lang="en-US" dirty="0"/>
-              <a:t>CONFLICTS IN ACTION</a:t>
-            </a:r>
-          </a:p>
-        </p:txBody>
-      </p:sp>
-      <p:sp>
-        <p:nvSpPr>
-          <p:cNvPr id="4" name="Date Placeholder 3"/>
-          <p:cNvSpPr>
-            <a:spLocks noGrp="1"/>
-          </p:cNvSpPr>
-          <p:nvPr>
-            <p:ph type="dt" sz="half" idx="10"/>
-          </p:nvPr>
-        </p:nvSpPr>
-        <p:spPr/>
-        <p:txBody>
-          <a:bodyPr/>
-          <a:lstStyle/>
-          <a:p>
-            <a:fld id="{74F93749-3CD2-4A95-98ED-FE9E109683BE}" type="datetime4">
-              <a:rPr lang="en-US" smtClean="0"/>
-              <a:t>June 6, 2019</a:t>
-            </a:fld>
-            <a:endParaRPr lang="en-US" dirty="0"/>
-          </a:p>
-        </p:txBody>
-      </p:sp>
-      <p:sp>
-        <p:nvSpPr>
-          <p:cNvPr id="5" name="Footer Placeholder 4"/>
-          <p:cNvSpPr>
-            <a:spLocks noGrp="1"/>
-          </p:cNvSpPr>
-          <p:nvPr>
-            <p:ph type="ftr" sz="quarter" idx="11"/>
-          </p:nvPr>
-        </p:nvSpPr>
-        <p:spPr/>
-        <p:txBody>
-          <a:bodyPr/>
-          <a:lstStyle/>
-          <a:p>
-            <a:r>
-              <a:rPr lang="en-US"/>
-              <a:t>Digital Scholarship Services </a:t>
-            </a:r>
-            <a:r>
-              <a:rPr lang="en-US">
-                <a:solidFill>
-                  <a:schemeClr val="accent1">
-                    <a:lumMod val="50000"/>
-                  </a:schemeClr>
-                </a:solidFill>
-              </a:rPr>
-              <a:t>| Email</a:t>
-            </a:r>
-            <a:r>
-              <a:rPr lang="en-US"/>
-              <a:t> cf24@rice.edu </a:t>
-            </a:r>
-            <a:r>
-              <a:rPr lang="en-US">
-                <a:solidFill>
-                  <a:schemeClr val="accent1">
-                    <a:lumMod val="50000"/>
-                  </a:schemeClr>
-                </a:solidFill>
-              </a:rPr>
-              <a:t>|</a:t>
-            </a:r>
-            <a:r>
-              <a:rPr lang="en-US"/>
-              <a:t> library.rice.edu/dss</a:t>
-            </a:r>
-            <a:endParaRPr lang="en-US" dirty="0"/>
-          </a:p>
-        </p:txBody>
-      </p:sp>
       <p:sp>
         <p:nvSpPr>
           <p:cNvPr id="6" name="Slide Number Placeholder 5"/>
@@ -12417,7 +12920,7 @@
           <a:p>
             <a:fld id="{D57F1E4F-1CFF-5643-939E-02111984F565}" type="slidenum">
               <a:rPr lang="en-US" smtClean="0"/>
-              <a:t>40</a:t>
+              <a:t>42</a:t>
             </a:fld>
             <a:endParaRPr lang="en-US" dirty="0"/>
           </a:p>
@@ -12708,7 +13211,7 @@
 </p:sld>
 </file>
 
-<file path=ppt/slides/slide41.xml><?xml version="1.0" encoding="utf-8"?>
+<file path=ppt/slides/slide43.xml><?xml version="1.0" encoding="utf-8"?>
 <p:sld xmlns:a="http://schemas.openxmlformats.org/drawingml/2006/main" xmlns:r="http://schemas.openxmlformats.org/officeDocument/2006/relationships" xmlns:p="http://schemas.openxmlformats.org/presentationml/2006/main">
   <p:cSld>
     <p:spTree>
@@ -12804,7 +13307,7 @@
           <a:p>
             <a:fld id="{74F93749-3CD2-4A95-98ED-FE9E109683BE}" type="datetime4">
               <a:rPr lang="en-US" smtClean="0"/>
-              <a:t>June 6, 2019</a:t>
+              <a:t>June 12, 2019</a:t>
             </a:fld>
             <a:endParaRPr lang="en-US" dirty="0"/>
           </a:p>
@@ -12878,7 +13381,7 @@
           <a:p>
             <a:fld id="{D57F1E4F-1CFF-5643-939E-02111984F565}" type="slidenum">
               <a:rPr lang="en-US" smtClean="0"/>
-              <a:t>41</a:t>
+              <a:t>43</a:t>
             </a:fld>
             <a:endParaRPr lang="en-US" dirty="0"/>
           </a:p>
@@ -12897,7 +13400,7 @@
 </p:sld>
 </file>
 
-<file path=ppt/slides/slide42.xml><?xml version="1.0" encoding="utf-8"?>
+<file path=ppt/slides/slide44.xml><?xml version="1.0" encoding="utf-8"?>
 <p:sld xmlns:a="http://schemas.openxmlformats.org/drawingml/2006/main" xmlns:r="http://schemas.openxmlformats.org/officeDocument/2006/relationships" xmlns:p="http://schemas.openxmlformats.org/presentationml/2006/main">
   <p:cSld>
     <p:spTree>
@@ -13061,7 +13564,7 @@
           <a:p>
             <a:fld id="{9985793D-3B5D-46A1-A058-9C498F103400}" type="datetime4">
               <a:rPr lang="en-US" smtClean="0"/>
-              <a:t>June 6, 2019</a:t>
+              <a:t>June 12, 2019</a:t>
             </a:fld>
             <a:endParaRPr lang="en-US" dirty="0"/>
           </a:p>
@@ -13084,7 +13587,7 @@
           <a:p>
             <a:fld id="{D57F1E4F-1CFF-5643-939E-02111984F565}" type="slidenum">
               <a:rPr lang="en-US" smtClean="0"/>
-              <a:t>42</a:t>
+              <a:t>44</a:t>
             </a:fld>
             <a:endParaRPr lang="en-US" dirty="0"/>
           </a:p>
@@ -13280,7 +13783,7 @@
           <a:p>
             <a:fld id="{FB169DAF-4CD7-4B82-BB7C-54F3FCD01B55}" type="datetime4">
               <a:rPr lang="en-US" smtClean="0"/>
-              <a:t>June 6, 2019</a:t>
+              <a:t>June 12, 2019</a:t>
             </a:fld>
             <a:endParaRPr lang="en-US" dirty="0"/>
           </a:p>
@@ -13513,7 +14016,7 @@
           <a:p>
             <a:fld id="{4573C887-AB40-46D8-8F4C-D4BD7F03A5A2}" type="datetime4">
               <a:rPr lang="en-US" smtClean="0"/>
-              <a:t>June 6, 2019</a:t>
+              <a:t>June 12, 2019</a:t>
             </a:fld>
             <a:endParaRPr lang="en-US" dirty="0"/>
           </a:p>
@@ -13709,7 +14212,7 @@
           <a:p>
             <a:fld id="{0E6AE29B-8C09-43B5-86A8-3F3FC8EBB2F2}" type="datetime4">
               <a:rPr lang="en-US" smtClean="0"/>
-              <a:t>June 6, 2019</a:t>
+              <a:t>June 12, 2019</a:t>
             </a:fld>
             <a:endParaRPr lang="en-US" dirty="0"/>
           </a:p>
@@ -13992,7 +14495,7 @@
           <a:p>
             <a:fld id="{028403BE-1A09-4C34-8E7D-EE75D3FBE4FE}" type="datetime4">
               <a:rPr lang="en-US" smtClean="0"/>
-              <a:t>June 6, 2019</a:t>
+              <a:t>June 12, 2019</a:t>
             </a:fld>
             <a:endParaRPr lang="en-US" dirty="0"/>
           </a:p>
@@ -14192,7 +14695,7 @@
           <a:p>
             <a:fld id="{4815664E-A18A-488C-8881-DD662D5EA9B7}" type="datetime4">
               <a:rPr lang="en-US" smtClean="0"/>
-              <a:t>June 6, 2019</a:t>
+              <a:t>June 12, 2019</a:t>
             </a:fld>
             <a:endParaRPr lang="en-US" dirty="0"/>
           </a:p>

</xml_diff>